<commit_message>
Revise 3-tier architecture per feedback
</commit_message>
<xml_diff>
--- a/doc/three-tier-architecture-examples/crest-infosolutions-cloudmeet-architecture-diagram.pptx
+++ b/doc/three-tier-architecture-examples/crest-infosolutions-cloudmeet-architecture-diagram.pptx
@@ -224,7 +224,7 @@
           <a:p>
             <a:fld id="{49A7721D-1176-A640-AC48-B82F78C92D56}" type="datetimeFigureOut">
               <a:rPr lang="en-US" smtClean="0"/>
-              <a:t>6/30/2022</a:t>
+              <a:t>7/19/2022</a:t>
             </a:fld>
             <a:endParaRPr lang="en-US" dirty="0"/>
           </a:p>
@@ -401,7 +401,7 @@
           <a:p>
             <a:fld id="{C884A089-FB25-6D46-9D21-F0F04A18BCA8}" type="datetimeFigureOut">
               <a:rPr lang="en-US" smtClean="0"/>
-              <a:t>6/30/2022</a:t>
+              <a:t>7/19/2022</a:t>
             </a:fld>
             <a:endParaRPr lang="en-US" dirty="0"/>
           </a:p>
@@ -1033,7 +1033,7 @@
           <a:p>
             <a:fld id="{C764DE79-268F-4C1A-8933-263129D2AF90}" type="datetimeFigureOut">
               <a:rPr lang="en-US" dirty="0"/>
-              <a:t>6/30/2022</a:t>
+              <a:t>7/19/2022</a:t>
             </a:fld>
             <a:endParaRPr lang="en-US" dirty="0"/>
           </a:p>
@@ -1204,7 +1204,7 @@
           <a:p>
             <a:fld id="{C764DE79-268F-4C1A-8933-263129D2AF90}" type="datetimeFigureOut">
               <a:rPr lang="en-US" dirty="0"/>
-              <a:t>6/30/2022</a:t>
+              <a:t>7/19/2022</a:t>
             </a:fld>
             <a:endParaRPr lang="en-US" dirty="0"/>
           </a:p>
@@ -1385,7 +1385,7 @@
           <a:p>
             <a:fld id="{C764DE79-268F-4C1A-8933-263129D2AF90}" type="datetimeFigureOut">
               <a:rPr lang="en-US" dirty="0"/>
-              <a:t>6/30/2022</a:t>
+              <a:t>7/19/2022</a:t>
             </a:fld>
             <a:endParaRPr lang="en-US" dirty="0"/>
           </a:p>
@@ -1578,7 +1578,7 @@
           <a:p>
             <a:fld id="{C764DE79-268F-4C1A-8933-263129D2AF90}" type="datetimeFigureOut">
               <a:rPr lang="en-US" dirty="0"/>
-              <a:t>6/30/2022</a:t>
+              <a:t>7/19/2022</a:t>
             </a:fld>
             <a:endParaRPr lang="en-US" dirty="0"/>
           </a:p>
@@ -1749,7 +1749,7 @@
           <a:p>
             <a:fld id="{C764DE79-268F-4C1A-8933-263129D2AF90}" type="datetimeFigureOut">
               <a:rPr lang="en-US" dirty="0"/>
-              <a:t>6/30/2022</a:t>
+              <a:t>7/19/2022</a:t>
             </a:fld>
             <a:endParaRPr lang="en-US" dirty="0"/>
           </a:p>
@@ -1994,7 +1994,7 @@
           <a:p>
             <a:fld id="{C764DE79-268F-4C1A-8933-263129D2AF90}" type="datetimeFigureOut">
               <a:rPr lang="en-US" dirty="0"/>
-              <a:t>6/30/2022</a:t>
+              <a:t>7/19/2022</a:t>
             </a:fld>
             <a:endParaRPr lang="en-US" dirty="0"/>
           </a:p>
@@ -2227,7 +2227,7 @@
           <a:p>
             <a:fld id="{C764DE79-268F-4C1A-8933-263129D2AF90}" type="datetimeFigureOut">
               <a:rPr lang="en-US" dirty="0"/>
-              <a:t>6/30/2022</a:t>
+              <a:t>7/19/2022</a:t>
             </a:fld>
             <a:endParaRPr lang="en-US" dirty="0"/>
           </a:p>
@@ -2595,7 +2595,7 @@
           <a:p>
             <a:fld id="{C764DE79-268F-4C1A-8933-263129D2AF90}" type="datetimeFigureOut">
               <a:rPr lang="en-US" dirty="0"/>
-              <a:t>6/30/2022</a:t>
+              <a:t>7/19/2022</a:t>
             </a:fld>
             <a:endParaRPr lang="en-US" dirty="0"/>
           </a:p>
@@ -2714,7 +2714,7 @@
           <a:p>
             <a:fld id="{C764DE79-268F-4C1A-8933-263129D2AF90}" type="datetimeFigureOut">
               <a:rPr lang="en-US" dirty="0"/>
-              <a:t>6/30/2022</a:t>
+              <a:t>7/19/2022</a:t>
             </a:fld>
             <a:endParaRPr lang="en-US" dirty="0"/>
           </a:p>
@@ -3083,7 +3083,7 @@
           <a:p>
             <a:fld id="{C764DE79-268F-4C1A-8933-263129D2AF90}" type="datetimeFigureOut">
               <a:rPr lang="en-US" dirty="0"/>
-              <a:t>6/30/2022</a:t>
+              <a:t>7/19/2022</a:t>
             </a:fld>
             <a:endParaRPr lang="en-US" dirty="0"/>
           </a:p>
@@ -3617,7 +3617,7 @@
           <a:p>
             <a:fld id="{C764DE79-268F-4C1A-8933-263129D2AF90}" type="datetimeFigureOut">
               <a:rPr lang="en-US" dirty="0"/>
-              <a:t>6/30/2022</a:t>
+              <a:t>7/19/2022</a:t>
             </a:fld>
             <a:endParaRPr lang="en-US" dirty="0"/>
           </a:p>
@@ -4025,6 +4025,72 @@
       </p:grpSpPr>
       <p:sp>
         <p:nvSpPr>
+          <p:cNvPr id="104" name="Rectangle 103">
+            <a:extLst>
+              <a:ext uri="{FF2B5EF4-FFF2-40B4-BE49-F238E27FC236}">
+                <a16:creationId xmlns:a16="http://schemas.microsoft.com/office/drawing/2014/main" id="{EF9D6B6F-1AE7-47AE-BF84-8DE49D989F24}"/>
+              </a:ext>
+            </a:extLst>
+          </p:cNvPr>
+          <p:cNvSpPr/>
+          <p:nvPr/>
+        </p:nvSpPr>
+        <p:spPr>
+          <a:xfrm>
+            <a:off x="2651760" y="4206240"/>
+            <a:ext cx="1737360" cy="2834640"/>
+          </a:xfrm>
+          <a:prstGeom prst="rect">
+            <a:avLst/>
+          </a:prstGeom>
+          <a:solidFill>
+            <a:srgbClr val="007CBC">
+              <a:alpha val="9804"/>
+            </a:srgbClr>
+          </a:solidFill>
+          <a:ln w="12700">
+            <a:noFill/>
+            <a:prstDash val="dash"/>
+          </a:ln>
+        </p:spPr>
+        <p:style>
+          <a:lnRef idx="2">
+            <a:schemeClr val="accent1">
+              <a:shade val="50000"/>
+            </a:schemeClr>
+          </a:lnRef>
+          <a:fillRef idx="1">
+            <a:schemeClr val="accent1"/>
+          </a:fillRef>
+          <a:effectRef idx="0">
+            <a:schemeClr val="accent1"/>
+          </a:effectRef>
+          <a:fontRef idx="minor">
+            <a:schemeClr val="lt1"/>
+          </a:fontRef>
+        </p:style>
+        <p:txBody>
+          <a:bodyPr lIns="502920"/>
+          <a:lstStyle/>
+          <a:p>
+            <a:pPr>
+              <a:defRPr/>
+            </a:pPr>
+            <a:r>
+              <a:rPr lang="en-US" sz="1200" dirty="0">
+                <a:solidFill>
+                  <a:srgbClr val="5B9CD5"/>
+                </a:solidFill>
+                <a:latin typeface="Arial" panose="020B0604020202020204" pitchFamily="34" charset="0"/>
+                <a:cs typeface="Arial" panose="020B0604020202020204" pitchFamily="34" charset="0"/>
+              </a:rPr>
+              <a:t>Private subnet</a:t>
+            </a:r>
+          </a:p>
+        </p:txBody>
+      </p:sp>
+      <p:sp>
+        <p:nvSpPr>
           <p:cNvPr id="102" name="Rectangle 101">
             <a:extLst>
               <a:ext uri="{FF2B5EF4-FFF2-40B4-BE49-F238E27FC236}">
@@ -4104,73 +4170,7 @@
         <p:spPr>
           <a:xfrm>
             <a:off x="6217920" y="4206240"/>
-            <a:ext cx="1737360" cy="2103120"/>
-          </a:xfrm>
-          <a:prstGeom prst="rect">
-            <a:avLst/>
-          </a:prstGeom>
-          <a:solidFill>
-            <a:srgbClr val="007CBC">
-              <a:alpha val="9804"/>
-            </a:srgbClr>
-          </a:solidFill>
-          <a:ln w="12700">
-            <a:noFill/>
-            <a:prstDash val="dash"/>
-          </a:ln>
-        </p:spPr>
-        <p:style>
-          <a:lnRef idx="2">
-            <a:schemeClr val="accent1">
-              <a:shade val="50000"/>
-            </a:schemeClr>
-          </a:lnRef>
-          <a:fillRef idx="1">
-            <a:schemeClr val="accent1"/>
-          </a:fillRef>
-          <a:effectRef idx="0">
-            <a:schemeClr val="accent1"/>
-          </a:effectRef>
-          <a:fontRef idx="minor">
-            <a:schemeClr val="lt1"/>
-          </a:fontRef>
-        </p:style>
-        <p:txBody>
-          <a:bodyPr lIns="502920"/>
-          <a:lstStyle/>
-          <a:p>
-            <a:pPr>
-              <a:defRPr/>
-            </a:pPr>
-            <a:r>
-              <a:rPr lang="en-US" sz="1200" dirty="0">
-                <a:solidFill>
-                  <a:srgbClr val="5B9CD5"/>
-                </a:solidFill>
-                <a:latin typeface="Arial" panose="020B0604020202020204" pitchFamily="34" charset="0"/>
-                <a:cs typeface="Arial" panose="020B0604020202020204" pitchFamily="34" charset="0"/>
-              </a:rPr>
-              <a:t>Private subnet</a:t>
-            </a:r>
-          </a:p>
-        </p:txBody>
-      </p:sp>
-      <p:sp>
-        <p:nvSpPr>
-          <p:cNvPr id="104" name="Rectangle 103">
-            <a:extLst>
-              <a:ext uri="{FF2B5EF4-FFF2-40B4-BE49-F238E27FC236}">
-                <a16:creationId xmlns:a16="http://schemas.microsoft.com/office/drawing/2014/main" id="{EF9D6B6F-1AE7-47AE-BF84-8DE49D989F24}"/>
-              </a:ext>
-            </a:extLst>
-          </p:cNvPr>
-          <p:cNvSpPr/>
-          <p:nvPr/>
-        </p:nvSpPr>
-        <p:spPr>
-          <a:xfrm>
-            <a:off x="2651760" y="4206240"/>
-            <a:ext cx="1737360" cy="2103120"/>
+            <a:ext cx="1737360" cy="2834640"/>
           </a:xfrm>
           <a:prstGeom prst="rect">
             <a:avLst/>
@@ -4758,7 +4758,7 @@
         </p:blipFill>
         <p:spPr bwMode="auto">
           <a:xfrm>
-            <a:off x="10149840" y="2011680"/>
+            <a:off x="10149840" y="2281191"/>
             <a:ext cx="762000" cy="762000"/>
           </a:xfrm>
           <a:prstGeom prst="rect">
@@ -4805,7 +4805,7 @@
         </p:nvSpPr>
         <p:spPr bwMode="auto">
           <a:xfrm>
-            <a:off x="9691390" y="2774786"/>
+            <a:off x="9691390" y="3044297"/>
             <a:ext cx="1682079" cy="276999"/>
           </a:xfrm>
           <a:prstGeom prst="rect">
@@ -4952,684 +4952,6 @@
       </p:sp>
       <p:sp>
         <p:nvSpPr>
-          <p:cNvPr id="87" name="TextBox 22">
-            <a:extLst>
-              <a:ext uri="{FF2B5EF4-FFF2-40B4-BE49-F238E27FC236}">
-                <a16:creationId xmlns:a16="http://schemas.microsoft.com/office/drawing/2014/main" id="{8CA3E7D6-93C0-4492-8718-E180D0C58145}"/>
-              </a:ext>
-            </a:extLst>
-          </p:cNvPr>
-          <p:cNvSpPr txBox="1">
-            <a:spLocks noChangeArrowheads="1"/>
-          </p:cNvSpPr>
-          <p:nvPr/>
-        </p:nvSpPr>
-        <p:spPr bwMode="auto">
-          <a:xfrm>
-            <a:off x="4767691" y="3567771"/>
-            <a:ext cx="1053039" cy="430887"/>
-          </a:xfrm>
-          <a:prstGeom prst="rect">
-            <a:avLst/>
-          </a:prstGeom>
-          <a:noFill/>
-          <a:ln>
-            <a:noFill/>
-          </a:ln>
-          <a:extLst>
-            <a:ext uri="{909E8E84-426E-40DD-AFC4-6F175D3DCCD1}">
-              <a14:hiddenFill xmlns:a14="http://schemas.microsoft.com/office/drawing/2010/main">
-                <a:solidFill>
-                  <a:srgbClr val="FFFFFF"/>
-                </a:solidFill>
-              </a14:hiddenFill>
-            </a:ext>
-            <a:ext uri="{91240B29-F687-4F45-9708-019B960494DF}">
-              <a14:hiddenLine xmlns:a14="http://schemas.microsoft.com/office/drawing/2010/main" w="9525">
-                <a:solidFill>
-                  <a:srgbClr val="000000"/>
-                </a:solidFill>
-                <a:miter lim="800000"/>
-                <a:headEnd/>
-                <a:tailEnd/>
-              </a14:hiddenLine>
-            </a:ext>
-          </a:extLst>
-        </p:spPr>
-        <p:txBody>
-          <a:bodyPr wrap="square">
-            <a:spAutoFit/>
-          </a:bodyPr>
-          <a:lstStyle>
-            <a:lvl1pPr>
-              <a:defRPr>
-                <a:solidFill>
-                  <a:schemeClr val="tx1"/>
-                </a:solidFill>
-                <a:latin typeface="Calibri" panose="020F0502020204030204" pitchFamily="34" charset="0"/>
-              </a:defRPr>
-            </a:lvl1pPr>
-            <a:lvl2pPr marL="742950" indent="-285750">
-              <a:defRPr>
-                <a:solidFill>
-                  <a:schemeClr val="tx1"/>
-                </a:solidFill>
-                <a:latin typeface="Calibri" panose="020F0502020204030204" pitchFamily="34" charset="0"/>
-              </a:defRPr>
-            </a:lvl2pPr>
-            <a:lvl3pPr marL="1143000" indent="-228600">
-              <a:defRPr>
-                <a:solidFill>
-                  <a:schemeClr val="tx1"/>
-                </a:solidFill>
-                <a:latin typeface="Calibri" panose="020F0502020204030204" pitchFamily="34" charset="0"/>
-              </a:defRPr>
-            </a:lvl3pPr>
-            <a:lvl4pPr marL="1600200" indent="-228600">
-              <a:defRPr>
-                <a:solidFill>
-                  <a:schemeClr val="tx1"/>
-                </a:solidFill>
-                <a:latin typeface="Calibri" panose="020F0502020204030204" pitchFamily="34" charset="0"/>
-              </a:defRPr>
-            </a:lvl4pPr>
-            <a:lvl5pPr marL="2057400" indent="-228600">
-              <a:defRPr>
-                <a:solidFill>
-                  <a:schemeClr val="tx1"/>
-                </a:solidFill>
-                <a:latin typeface="Calibri" panose="020F0502020204030204" pitchFamily="34" charset="0"/>
-              </a:defRPr>
-            </a:lvl5pPr>
-            <a:lvl6pPr marL="2514600" indent="-228600" eaLnBrk="0" fontAlgn="base" hangingPunct="0">
-              <a:spcBef>
-                <a:spcPct val="0"/>
-              </a:spcBef>
-              <a:spcAft>
-                <a:spcPct val="0"/>
-              </a:spcAft>
-              <a:defRPr>
-                <a:solidFill>
-                  <a:schemeClr val="tx1"/>
-                </a:solidFill>
-                <a:latin typeface="Calibri" panose="020F0502020204030204" pitchFamily="34" charset="0"/>
-              </a:defRPr>
-            </a:lvl6pPr>
-            <a:lvl7pPr marL="2971800" indent="-228600" eaLnBrk="0" fontAlgn="base" hangingPunct="0">
-              <a:spcBef>
-                <a:spcPct val="0"/>
-              </a:spcBef>
-              <a:spcAft>
-                <a:spcPct val="0"/>
-              </a:spcAft>
-              <a:defRPr>
-                <a:solidFill>
-                  <a:schemeClr val="tx1"/>
-                </a:solidFill>
-                <a:latin typeface="Calibri" panose="020F0502020204030204" pitchFamily="34" charset="0"/>
-              </a:defRPr>
-            </a:lvl7pPr>
-            <a:lvl8pPr marL="3429000" indent="-228600" eaLnBrk="0" fontAlgn="base" hangingPunct="0">
-              <a:spcBef>
-                <a:spcPct val="0"/>
-              </a:spcBef>
-              <a:spcAft>
-                <a:spcPct val="0"/>
-              </a:spcAft>
-              <a:defRPr>
-                <a:solidFill>
-                  <a:schemeClr val="tx1"/>
-                </a:solidFill>
-                <a:latin typeface="Calibri" panose="020F0502020204030204" pitchFamily="34" charset="0"/>
-              </a:defRPr>
-            </a:lvl8pPr>
-            <a:lvl9pPr marL="3886200" indent="-228600" eaLnBrk="0" fontAlgn="base" hangingPunct="0">
-              <a:spcBef>
-                <a:spcPct val="0"/>
-              </a:spcBef>
-              <a:spcAft>
-                <a:spcPct val="0"/>
-              </a:spcAft>
-              <a:defRPr>
-                <a:solidFill>
-                  <a:schemeClr val="tx1"/>
-                </a:solidFill>
-                <a:latin typeface="Calibri" panose="020F0502020204030204" pitchFamily="34" charset="0"/>
-              </a:defRPr>
-            </a:lvl9pPr>
-          </a:lstStyle>
-          <a:p>
-            <a:pPr algn="ctr" eaLnBrk="1" hangingPunct="1"/>
-            <a:r>
-              <a:rPr lang="en-US" altLang="en-US" sz="1100" dirty="0">
-                <a:latin typeface="Arial" panose="020B0604020202020204" pitchFamily="34" charset="0"/>
-                <a:ea typeface="Amazon Ember" panose="020B0603020204020204" pitchFamily="34" charset="0"/>
-                <a:cs typeface="Arial" panose="020B0604020202020204" pitchFamily="34" charset="0"/>
-              </a:rPr>
-              <a:t>Network Load </a:t>
-            </a:r>
-            <a:br>
-              <a:rPr lang="en-US" altLang="en-US" sz="1100" dirty="0">
-                <a:latin typeface="Arial" panose="020B0604020202020204" pitchFamily="34" charset="0"/>
-                <a:ea typeface="Amazon Ember" panose="020B0603020204020204" pitchFamily="34" charset="0"/>
-                <a:cs typeface="Arial" panose="020B0604020202020204" pitchFamily="34" charset="0"/>
-              </a:rPr>
-            </a:br>
-            <a:r>
-              <a:rPr lang="en-US" altLang="en-US" sz="1100" dirty="0">
-                <a:latin typeface="Arial" panose="020B0604020202020204" pitchFamily="34" charset="0"/>
-                <a:ea typeface="Amazon Ember" panose="020B0603020204020204" pitchFamily="34" charset="0"/>
-                <a:cs typeface="Arial" panose="020B0604020202020204" pitchFamily="34" charset="0"/>
-              </a:rPr>
-              <a:t>Balancer</a:t>
-            </a:r>
-          </a:p>
-        </p:txBody>
-      </p:sp>
-      <p:pic>
-        <p:nvPicPr>
-          <p:cNvPr id="88" name="Graphic 24">
-            <a:extLst>
-              <a:ext uri="{FF2B5EF4-FFF2-40B4-BE49-F238E27FC236}">
-                <a16:creationId xmlns:a16="http://schemas.microsoft.com/office/drawing/2014/main" id="{021B0B37-BBA6-4E9D-B73F-29CE0A84F100}"/>
-              </a:ext>
-            </a:extLst>
-          </p:cNvPr>
-          <p:cNvPicPr>
-            <a:picLocks noChangeAspect="1" noChangeArrowheads="1"/>
-          </p:cNvPicPr>
-          <p:nvPr/>
-        </p:nvPicPr>
-        <p:blipFill>
-          <a:blip r:embed="rId5">
-            <a:extLst>
-              <a:ext uri="{28A0092B-C50C-407E-A947-70E740481C1C}">
-                <a14:useLocalDpi xmlns:a14="http://schemas.microsoft.com/office/drawing/2010/main" val="0"/>
-              </a:ext>
-            </a:extLst>
-          </a:blip>
-          <a:srcRect/>
-          <a:stretch>
-            <a:fillRect/>
-          </a:stretch>
-        </p:blipFill>
-        <p:spPr bwMode="auto">
-          <a:xfrm>
-            <a:off x="5065776" y="3108960"/>
-            <a:ext cx="457200" cy="457200"/>
-          </a:xfrm>
-          <a:prstGeom prst="rect">
-            <a:avLst/>
-          </a:prstGeom>
-          <a:noFill/>
-          <a:ln>
-            <a:noFill/>
-          </a:ln>
-          <a:extLst>
-            <a:ext uri="{909E8E84-426E-40DD-AFC4-6F175D3DCCD1}">
-              <a14:hiddenFill xmlns:a14="http://schemas.microsoft.com/office/drawing/2010/main">
-                <a:solidFill>
-                  <a:srgbClr val="FFFFFF"/>
-                </a:solidFill>
-              </a14:hiddenFill>
-            </a:ext>
-            <a:ext uri="{91240B29-F687-4F45-9708-019B960494DF}">
-              <a14:hiddenLine xmlns:a14="http://schemas.microsoft.com/office/drawing/2010/main" w="9525">
-                <a:solidFill>
-                  <a:srgbClr val="000000"/>
-                </a:solidFill>
-                <a:miter lim="800000"/>
-                <a:headEnd/>
-                <a:tailEnd/>
-              </a14:hiddenLine>
-            </a:ext>
-          </a:extLst>
-        </p:spPr>
-      </p:pic>
-      <p:pic>
-        <p:nvPicPr>
-          <p:cNvPr id="89" name="Graphic 14">
-            <a:extLst>
-              <a:ext uri="{FF2B5EF4-FFF2-40B4-BE49-F238E27FC236}">
-                <a16:creationId xmlns:a16="http://schemas.microsoft.com/office/drawing/2014/main" id="{EBCA5556-883E-4757-BA09-F0000B656815}"/>
-              </a:ext>
-            </a:extLst>
-          </p:cNvPr>
-          <p:cNvPicPr>
-            <a:picLocks noChangeAspect="1" noChangeArrowheads="1"/>
-          </p:cNvPicPr>
-          <p:nvPr/>
-        </p:nvPicPr>
-        <p:blipFill>
-          <a:blip r:embed="rId6">
-            <a:extLst>
-              <a:ext uri="{28A0092B-C50C-407E-A947-70E740481C1C}">
-                <a14:useLocalDpi xmlns:a14="http://schemas.microsoft.com/office/drawing/2010/main" val="0"/>
-              </a:ext>
-            </a:extLst>
-          </a:blip>
-          <a:srcRect/>
-          <a:stretch>
-            <a:fillRect/>
-          </a:stretch>
-        </p:blipFill>
-        <p:spPr bwMode="auto">
-          <a:xfrm>
-            <a:off x="3108960" y="4941287"/>
-            <a:ext cx="762000" cy="762000"/>
-          </a:xfrm>
-          <a:prstGeom prst="rect">
-            <a:avLst/>
-          </a:prstGeom>
-          <a:noFill/>
-          <a:ln>
-            <a:noFill/>
-          </a:ln>
-          <a:extLst>
-            <a:ext uri="{909E8E84-426E-40DD-AFC4-6F175D3DCCD1}">
-              <a14:hiddenFill xmlns:a14="http://schemas.microsoft.com/office/drawing/2010/main">
-                <a:solidFill>
-                  <a:srgbClr val="FFFFFF"/>
-                </a:solidFill>
-              </a14:hiddenFill>
-            </a:ext>
-            <a:ext uri="{91240B29-F687-4F45-9708-019B960494DF}">
-              <a14:hiddenLine xmlns:a14="http://schemas.microsoft.com/office/drawing/2010/main" w="9525">
-                <a:solidFill>
-                  <a:srgbClr val="000000"/>
-                </a:solidFill>
-                <a:miter lim="800000"/>
-                <a:headEnd/>
-                <a:tailEnd/>
-              </a14:hiddenLine>
-            </a:ext>
-          </a:extLst>
-        </p:spPr>
-      </p:pic>
-      <p:sp>
-        <p:nvSpPr>
-          <p:cNvPr id="90" name="TextBox 12">
-            <a:extLst>
-              <a:ext uri="{FF2B5EF4-FFF2-40B4-BE49-F238E27FC236}">
-                <a16:creationId xmlns:a16="http://schemas.microsoft.com/office/drawing/2014/main" id="{94AAD9BF-9F68-4B51-9596-90E798CA9903}"/>
-              </a:ext>
-            </a:extLst>
-          </p:cNvPr>
-          <p:cNvSpPr txBox="1">
-            <a:spLocks noChangeArrowheads="1"/>
-          </p:cNvSpPr>
-          <p:nvPr/>
-        </p:nvSpPr>
-        <p:spPr bwMode="auto">
-          <a:xfrm>
-            <a:off x="2920985" y="5706206"/>
-            <a:ext cx="1139858" cy="276999"/>
-          </a:xfrm>
-          <a:prstGeom prst="rect">
-            <a:avLst/>
-          </a:prstGeom>
-          <a:noFill/>
-          <a:ln>
-            <a:noFill/>
-          </a:ln>
-          <a:extLst>
-            <a:ext uri="{909E8E84-426E-40DD-AFC4-6F175D3DCCD1}">
-              <a14:hiddenFill xmlns:a14="http://schemas.microsoft.com/office/drawing/2010/main">
-                <a:solidFill>
-                  <a:srgbClr val="FFFFFF"/>
-                </a:solidFill>
-              </a14:hiddenFill>
-            </a:ext>
-            <a:ext uri="{91240B29-F687-4F45-9708-019B960494DF}">
-              <a14:hiddenLine xmlns:a14="http://schemas.microsoft.com/office/drawing/2010/main" w="9525">
-                <a:solidFill>
-                  <a:srgbClr val="000000"/>
-                </a:solidFill>
-                <a:miter lim="800000"/>
-                <a:headEnd/>
-                <a:tailEnd/>
-              </a14:hiddenLine>
-            </a:ext>
-          </a:extLst>
-        </p:spPr>
-        <p:txBody>
-          <a:bodyPr wrap="square">
-            <a:spAutoFit/>
-          </a:bodyPr>
-          <a:lstStyle>
-            <a:lvl1pPr>
-              <a:defRPr>
-                <a:solidFill>
-                  <a:schemeClr val="tx1"/>
-                </a:solidFill>
-                <a:latin typeface="Calibri" panose="020F0502020204030204" pitchFamily="34" charset="0"/>
-              </a:defRPr>
-            </a:lvl1pPr>
-            <a:lvl2pPr marL="742950" indent="-285750">
-              <a:defRPr>
-                <a:solidFill>
-                  <a:schemeClr val="tx1"/>
-                </a:solidFill>
-                <a:latin typeface="Calibri" panose="020F0502020204030204" pitchFamily="34" charset="0"/>
-              </a:defRPr>
-            </a:lvl2pPr>
-            <a:lvl3pPr marL="1143000" indent="-228600">
-              <a:defRPr>
-                <a:solidFill>
-                  <a:schemeClr val="tx1"/>
-                </a:solidFill>
-                <a:latin typeface="Calibri" panose="020F0502020204030204" pitchFamily="34" charset="0"/>
-              </a:defRPr>
-            </a:lvl3pPr>
-            <a:lvl4pPr marL="1600200" indent="-228600">
-              <a:defRPr>
-                <a:solidFill>
-                  <a:schemeClr val="tx1"/>
-                </a:solidFill>
-                <a:latin typeface="Calibri" panose="020F0502020204030204" pitchFamily="34" charset="0"/>
-              </a:defRPr>
-            </a:lvl4pPr>
-            <a:lvl5pPr marL="2057400" indent="-228600">
-              <a:defRPr>
-                <a:solidFill>
-                  <a:schemeClr val="tx1"/>
-                </a:solidFill>
-                <a:latin typeface="Calibri" panose="020F0502020204030204" pitchFamily="34" charset="0"/>
-              </a:defRPr>
-            </a:lvl5pPr>
-            <a:lvl6pPr marL="2514600" indent="-228600" eaLnBrk="0" fontAlgn="base" hangingPunct="0">
-              <a:spcBef>
-                <a:spcPct val="0"/>
-              </a:spcBef>
-              <a:spcAft>
-                <a:spcPct val="0"/>
-              </a:spcAft>
-              <a:defRPr>
-                <a:solidFill>
-                  <a:schemeClr val="tx1"/>
-                </a:solidFill>
-                <a:latin typeface="Calibri" panose="020F0502020204030204" pitchFamily="34" charset="0"/>
-              </a:defRPr>
-            </a:lvl6pPr>
-            <a:lvl7pPr marL="2971800" indent="-228600" eaLnBrk="0" fontAlgn="base" hangingPunct="0">
-              <a:spcBef>
-                <a:spcPct val="0"/>
-              </a:spcBef>
-              <a:spcAft>
-                <a:spcPct val="0"/>
-              </a:spcAft>
-              <a:defRPr>
-                <a:solidFill>
-                  <a:schemeClr val="tx1"/>
-                </a:solidFill>
-                <a:latin typeface="Calibri" panose="020F0502020204030204" pitchFamily="34" charset="0"/>
-              </a:defRPr>
-            </a:lvl7pPr>
-            <a:lvl8pPr marL="3429000" indent="-228600" eaLnBrk="0" fontAlgn="base" hangingPunct="0">
-              <a:spcBef>
-                <a:spcPct val="0"/>
-              </a:spcBef>
-              <a:spcAft>
-                <a:spcPct val="0"/>
-              </a:spcAft>
-              <a:defRPr>
-                <a:solidFill>
-                  <a:schemeClr val="tx1"/>
-                </a:solidFill>
-                <a:latin typeface="Calibri" panose="020F0502020204030204" pitchFamily="34" charset="0"/>
-              </a:defRPr>
-            </a:lvl8pPr>
-            <a:lvl9pPr marL="3886200" indent="-228600" eaLnBrk="0" fontAlgn="base" hangingPunct="0">
-              <a:spcBef>
-                <a:spcPct val="0"/>
-              </a:spcBef>
-              <a:spcAft>
-                <a:spcPct val="0"/>
-              </a:spcAft>
-              <a:defRPr>
-                <a:solidFill>
-                  <a:schemeClr val="tx1"/>
-                </a:solidFill>
-                <a:latin typeface="Calibri" panose="020F0502020204030204" pitchFamily="34" charset="0"/>
-              </a:defRPr>
-            </a:lvl9pPr>
-          </a:lstStyle>
-          <a:p>
-            <a:pPr algn="ctr" eaLnBrk="1" hangingPunct="1"/>
-            <a:r>
-              <a:rPr lang="en-US" altLang="en-US" sz="1200" dirty="0">
-                <a:latin typeface="Arial" panose="020B0604020202020204" pitchFamily="34" charset="0"/>
-                <a:ea typeface="Amazon Ember" panose="020B0603020204020204" pitchFamily="34" charset="0"/>
-                <a:cs typeface="Arial" panose="020B0604020202020204" pitchFamily="34" charset="0"/>
-              </a:rPr>
-              <a:t>AWS Fargate</a:t>
-            </a:r>
-          </a:p>
-        </p:txBody>
-      </p:sp>
-      <p:pic>
-        <p:nvPicPr>
-          <p:cNvPr id="91" name="Graphic 14">
-            <a:extLst>
-              <a:ext uri="{FF2B5EF4-FFF2-40B4-BE49-F238E27FC236}">
-                <a16:creationId xmlns:a16="http://schemas.microsoft.com/office/drawing/2014/main" id="{F2790F7E-E7ED-4E49-A2E8-2C38DC86CA66}"/>
-              </a:ext>
-            </a:extLst>
-          </p:cNvPr>
-          <p:cNvPicPr>
-            <a:picLocks noChangeAspect="1" noChangeArrowheads="1"/>
-          </p:cNvPicPr>
-          <p:nvPr/>
-        </p:nvPicPr>
-        <p:blipFill>
-          <a:blip r:embed="rId6">
-            <a:extLst>
-              <a:ext uri="{28A0092B-C50C-407E-A947-70E740481C1C}">
-                <a14:useLocalDpi xmlns:a14="http://schemas.microsoft.com/office/drawing/2010/main" val="0"/>
-              </a:ext>
-            </a:extLst>
-          </a:blip>
-          <a:srcRect/>
-          <a:stretch>
-            <a:fillRect/>
-          </a:stretch>
-        </p:blipFill>
-        <p:spPr bwMode="auto">
-          <a:xfrm>
-            <a:off x="6675120" y="4941287"/>
-            <a:ext cx="762000" cy="762000"/>
-          </a:xfrm>
-          <a:prstGeom prst="rect">
-            <a:avLst/>
-          </a:prstGeom>
-          <a:noFill/>
-          <a:ln>
-            <a:noFill/>
-          </a:ln>
-          <a:extLst>
-            <a:ext uri="{909E8E84-426E-40DD-AFC4-6F175D3DCCD1}">
-              <a14:hiddenFill xmlns:a14="http://schemas.microsoft.com/office/drawing/2010/main">
-                <a:solidFill>
-                  <a:srgbClr val="FFFFFF"/>
-                </a:solidFill>
-              </a14:hiddenFill>
-            </a:ext>
-            <a:ext uri="{91240B29-F687-4F45-9708-019B960494DF}">
-              <a14:hiddenLine xmlns:a14="http://schemas.microsoft.com/office/drawing/2010/main" w="9525">
-                <a:solidFill>
-                  <a:srgbClr val="000000"/>
-                </a:solidFill>
-                <a:miter lim="800000"/>
-                <a:headEnd/>
-                <a:tailEnd/>
-              </a14:hiddenLine>
-            </a:ext>
-          </a:extLst>
-        </p:spPr>
-      </p:pic>
-      <p:sp>
-        <p:nvSpPr>
-          <p:cNvPr id="92" name="TextBox 12">
-            <a:extLst>
-              <a:ext uri="{FF2B5EF4-FFF2-40B4-BE49-F238E27FC236}">
-                <a16:creationId xmlns:a16="http://schemas.microsoft.com/office/drawing/2014/main" id="{E745245B-8A2D-4553-9845-4DD2F80243F2}"/>
-              </a:ext>
-            </a:extLst>
-          </p:cNvPr>
-          <p:cNvSpPr txBox="1">
-            <a:spLocks noChangeArrowheads="1"/>
-          </p:cNvSpPr>
-          <p:nvPr/>
-        </p:nvSpPr>
-        <p:spPr bwMode="auto">
-          <a:xfrm>
-            <a:off x="6452198" y="5705068"/>
-            <a:ext cx="1212290" cy="276999"/>
-          </a:xfrm>
-          <a:prstGeom prst="rect">
-            <a:avLst/>
-          </a:prstGeom>
-          <a:noFill/>
-          <a:ln>
-            <a:noFill/>
-          </a:ln>
-          <a:extLst>
-            <a:ext uri="{909E8E84-426E-40DD-AFC4-6F175D3DCCD1}">
-              <a14:hiddenFill xmlns:a14="http://schemas.microsoft.com/office/drawing/2010/main">
-                <a:solidFill>
-                  <a:srgbClr val="FFFFFF"/>
-                </a:solidFill>
-              </a14:hiddenFill>
-            </a:ext>
-            <a:ext uri="{91240B29-F687-4F45-9708-019B960494DF}">
-              <a14:hiddenLine xmlns:a14="http://schemas.microsoft.com/office/drawing/2010/main" w="9525">
-                <a:solidFill>
-                  <a:srgbClr val="000000"/>
-                </a:solidFill>
-                <a:miter lim="800000"/>
-                <a:headEnd/>
-                <a:tailEnd/>
-              </a14:hiddenLine>
-            </a:ext>
-          </a:extLst>
-        </p:spPr>
-        <p:txBody>
-          <a:bodyPr wrap="square">
-            <a:spAutoFit/>
-          </a:bodyPr>
-          <a:lstStyle>
-            <a:lvl1pPr>
-              <a:defRPr>
-                <a:solidFill>
-                  <a:schemeClr val="tx1"/>
-                </a:solidFill>
-                <a:latin typeface="Calibri" panose="020F0502020204030204" pitchFamily="34" charset="0"/>
-              </a:defRPr>
-            </a:lvl1pPr>
-            <a:lvl2pPr marL="742950" indent="-285750">
-              <a:defRPr>
-                <a:solidFill>
-                  <a:schemeClr val="tx1"/>
-                </a:solidFill>
-                <a:latin typeface="Calibri" panose="020F0502020204030204" pitchFamily="34" charset="0"/>
-              </a:defRPr>
-            </a:lvl2pPr>
-            <a:lvl3pPr marL="1143000" indent="-228600">
-              <a:defRPr>
-                <a:solidFill>
-                  <a:schemeClr val="tx1"/>
-                </a:solidFill>
-                <a:latin typeface="Calibri" panose="020F0502020204030204" pitchFamily="34" charset="0"/>
-              </a:defRPr>
-            </a:lvl3pPr>
-            <a:lvl4pPr marL="1600200" indent="-228600">
-              <a:defRPr>
-                <a:solidFill>
-                  <a:schemeClr val="tx1"/>
-                </a:solidFill>
-                <a:latin typeface="Calibri" panose="020F0502020204030204" pitchFamily="34" charset="0"/>
-              </a:defRPr>
-            </a:lvl4pPr>
-            <a:lvl5pPr marL="2057400" indent="-228600">
-              <a:defRPr>
-                <a:solidFill>
-                  <a:schemeClr val="tx1"/>
-                </a:solidFill>
-                <a:latin typeface="Calibri" panose="020F0502020204030204" pitchFamily="34" charset="0"/>
-              </a:defRPr>
-            </a:lvl5pPr>
-            <a:lvl6pPr marL="2514600" indent="-228600" eaLnBrk="0" fontAlgn="base" hangingPunct="0">
-              <a:spcBef>
-                <a:spcPct val="0"/>
-              </a:spcBef>
-              <a:spcAft>
-                <a:spcPct val="0"/>
-              </a:spcAft>
-              <a:defRPr>
-                <a:solidFill>
-                  <a:schemeClr val="tx1"/>
-                </a:solidFill>
-                <a:latin typeface="Calibri" panose="020F0502020204030204" pitchFamily="34" charset="0"/>
-              </a:defRPr>
-            </a:lvl6pPr>
-            <a:lvl7pPr marL="2971800" indent="-228600" eaLnBrk="0" fontAlgn="base" hangingPunct="0">
-              <a:spcBef>
-                <a:spcPct val="0"/>
-              </a:spcBef>
-              <a:spcAft>
-                <a:spcPct val="0"/>
-              </a:spcAft>
-              <a:defRPr>
-                <a:solidFill>
-                  <a:schemeClr val="tx1"/>
-                </a:solidFill>
-                <a:latin typeface="Calibri" panose="020F0502020204030204" pitchFamily="34" charset="0"/>
-              </a:defRPr>
-            </a:lvl7pPr>
-            <a:lvl8pPr marL="3429000" indent="-228600" eaLnBrk="0" fontAlgn="base" hangingPunct="0">
-              <a:spcBef>
-                <a:spcPct val="0"/>
-              </a:spcBef>
-              <a:spcAft>
-                <a:spcPct val="0"/>
-              </a:spcAft>
-              <a:defRPr>
-                <a:solidFill>
-                  <a:schemeClr val="tx1"/>
-                </a:solidFill>
-                <a:latin typeface="Calibri" panose="020F0502020204030204" pitchFamily="34" charset="0"/>
-              </a:defRPr>
-            </a:lvl8pPr>
-            <a:lvl9pPr marL="3886200" indent="-228600" eaLnBrk="0" fontAlgn="base" hangingPunct="0">
-              <a:spcBef>
-                <a:spcPct val="0"/>
-              </a:spcBef>
-              <a:spcAft>
-                <a:spcPct val="0"/>
-              </a:spcAft>
-              <a:defRPr>
-                <a:solidFill>
-                  <a:schemeClr val="tx1"/>
-                </a:solidFill>
-                <a:latin typeface="Calibri" panose="020F0502020204030204" pitchFamily="34" charset="0"/>
-              </a:defRPr>
-            </a:lvl9pPr>
-          </a:lstStyle>
-          <a:p>
-            <a:pPr algn="ctr" eaLnBrk="1" hangingPunct="1"/>
-            <a:r>
-              <a:rPr lang="en-US" altLang="en-US" sz="1200" dirty="0">
-                <a:latin typeface="Arial" panose="020B0604020202020204" pitchFamily="34" charset="0"/>
-                <a:ea typeface="Amazon Ember" panose="020B0603020204020204" pitchFamily="34" charset="0"/>
-                <a:cs typeface="Arial" panose="020B0604020202020204" pitchFamily="34" charset="0"/>
-              </a:rPr>
-              <a:t>AWS Fargate</a:t>
-            </a:r>
-          </a:p>
-        </p:txBody>
-      </p:sp>
-      <p:sp>
-        <p:nvSpPr>
           <p:cNvPr id="94" name="Rectangle 93">
             <a:extLst>
               <a:ext uri="{FF2B5EF4-FFF2-40B4-BE49-F238E27FC236}">
@@ -5642,8 +4964,8 @@
         </p:nvSpPr>
         <p:spPr>
           <a:xfrm>
-            <a:off x="2834640" y="4758407"/>
-            <a:ext cx="4937760" cy="1280160"/>
+            <a:off x="3017520" y="4758407"/>
+            <a:ext cx="4572000" cy="1005840"/>
           </a:xfrm>
           <a:prstGeom prst="rect">
             <a:avLst/>
@@ -5731,10 +5053,10 @@
           <p:nvPr/>
         </p:nvPicPr>
         <p:blipFill>
-          <a:blip r:embed="rId7">
+          <a:blip r:embed="rId5">
             <a:extLst>
               <a:ext uri="{96DAC541-7B7A-43D3-8B79-37D633B846F1}">
-                <asvg:svgBlip xmlns:asvg="http://schemas.microsoft.com/office/drawing/2016/SVG/main" r:embed="rId8"/>
+                <asvg:svgBlip xmlns:asvg="http://schemas.microsoft.com/office/drawing/2016/SVG/main" r:embed="rId6"/>
               </a:ext>
             </a:extLst>
           </a:blip>
@@ -5767,7 +5089,7 @@
           <p:nvPr/>
         </p:nvPicPr>
         <p:blipFill>
-          <a:blip r:embed="rId9">
+          <a:blip r:embed="rId7">
             <a:extLst>
               <a:ext uri="{28A0092B-C50C-407E-A947-70E740481C1C}">
                 <a14:useLocalDpi xmlns:a14="http://schemas.microsoft.com/office/drawing/2010/main" val="0"/>
@@ -5993,10 +5315,10 @@
           <p:nvPr/>
         </p:nvPicPr>
         <p:blipFill>
-          <a:blip r:embed="rId10">
+          <a:blip r:embed="rId8">
             <a:extLst>
               <a:ext uri="{96DAC541-7B7A-43D3-8B79-37D633B846F1}">
-                <asvg:svgBlip xmlns:asvg="http://schemas.microsoft.com/office/drawing/2016/SVG/main" r:embed="rId11"/>
+                <asvg:svgBlip xmlns:asvg="http://schemas.microsoft.com/office/drawing/2016/SVG/main" r:embed="rId9"/>
               </a:ext>
             </a:extLst>
           </a:blip>
@@ -6029,10 +5351,10 @@
           <p:nvPr/>
         </p:nvPicPr>
         <p:blipFill>
-          <a:blip r:embed="rId10">
+          <a:blip r:embed="rId8">
             <a:extLst>
               <a:ext uri="{96DAC541-7B7A-43D3-8B79-37D633B846F1}">
-                <asvg:svgBlip xmlns:asvg="http://schemas.microsoft.com/office/drawing/2016/SVG/main" r:embed="rId11"/>
+                <asvg:svgBlip xmlns:asvg="http://schemas.microsoft.com/office/drawing/2016/SVG/main" r:embed="rId9"/>
               </a:ext>
             </a:extLst>
           </a:blip>
@@ -6065,10 +5387,10 @@
           <p:nvPr/>
         </p:nvPicPr>
         <p:blipFill>
-          <a:blip r:embed="rId12">
+          <a:blip r:embed="rId10">
             <a:extLst>
               <a:ext uri="{96DAC541-7B7A-43D3-8B79-37D633B846F1}">
-                <asvg:svgBlip xmlns:asvg="http://schemas.microsoft.com/office/drawing/2016/SVG/main" r:embed="rId13"/>
+                <asvg:svgBlip xmlns:asvg="http://schemas.microsoft.com/office/drawing/2016/SVG/main" r:embed="rId11"/>
               </a:ext>
             </a:extLst>
           </a:blip>
@@ -6101,10 +5423,10 @@
           <p:nvPr/>
         </p:nvPicPr>
         <p:blipFill>
-          <a:blip r:embed="rId12">
+          <a:blip r:embed="rId10">
             <a:extLst>
               <a:ext uri="{96DAC541-7B7A-43D3-8B79-37D633B846F1}">
-                <asvg:svgBlip xmlns:asvg="http://schemas.microsoft.com/office/drawing/2016/SVG/main" r:embed="rId13"/>
+                <asvg:svgBlip xmlns:asvg="http://schemas.microsoft.com/office/drawing/2016/SVG/main" r:embed="rId11"/>
               </a:ext>
             </a:extLst>
           </a:blip>
@@ -6137,7 +5459,7 @@
         <p:spPr>
           <a:xfrm>
             <a:off x="1005840" y="1737360"/>
-            <a:ext cx="10332720" cy="5669280"/>
+            <a:ext cx="10332720" cy="6126480"/>
           </a:xfrm>
           <a:prstGeom prst="rect">
             <a:avLst/>
@@ -6206,10 +5528,10 @@
           <p:nvPr/>
         </p:nvPicPr>
         <p:blipFill>
-          <a:blip r:embed="rId14">
+          <a:blip r:embed="rId12">
             <a:extLst>
               <a:ext uri="{96DAC541-7B7A-43D3-8B79-37D633B846F1}">
-                <asvg:svgBlip xmlns:asvg="http://schemas.microsoft.com/office/drawing/2016/SVG/main" r:embed="rId15"/>
+                <asvg:svgBlip xmlns:asvg="http://schemas.microsoft.com/office/drawing/2016/SVG/main" r:embed="rId13"/>
               </a:ext>
             </a:extLst>
           </a:blip>
@@ -6241,7 +5563,7 @@
         <p:spPr>
           <a:xfrm>
             <a:off x="1463040" y="2376846"/>
-            <a:ext cx="8229600" cy="4206240"/>
+            <a:ext cx="8229600" cy="5212080"/>
           </a:xfrm>
           <a:prstGeom prst="rect">
             <a:avLst/>
@@ -6311,10 +5633,10 @@
           <p:nvPr/>
         </p:nvPicPr>
         <p:blipFill>
-          <a:blip r:embed="rId16">
+          <a:blip r:embed="rId14">
             <a:extLst>
               <a:ext uri="{96DAC541-7B7A-43D3-8B79-37D633B846F1}">
-                <asvg:svgBlip xmlns:asvg="http://schemas.microsoft.com/office/drawing/2016/SVG/main" r:embed="rId17"/>
+                <asvg:svgBlip xmlns:asvg="http://schemas.microsoft.com/office/drawing/2016/SVG/main" r:embed="rId15"/>
               </a:ext>
             </a:extLst>
           </a:blip>
@@ -6347,7 +5669,7 @@
           <p:nvPr/>
         </p:nvPicPr>
         <p:blipFill>
-          <a:blip r:embed="rId18">
+          <a:blip r:embed="rId16">
             <a:extLst>
               <a:ext uri="{28A0092B-C50C-407E-A947-70E740481C1C}">
                 <a14:useLocalDpi xmlns:a14="http://schemas.microsoft.com/office/drawing/2010/main" val="0"/>
@@ -6361,7 +5683,7 @@
         </p:blipFill>
         <p:spPr bwMode="auto">
           <a:xfrm>
-            <a:off x="10149840" y="3383280"/>
+            <a:off x="10149840" y="3652791"/>
             <a:ext cx="762000" cy="762000"/>
           </a:xfrm>
           <a:prstGeom prst="rect">
@@ -6408,7 +5730,7 @@
         </p:nvSpPr>
         <p:spPr bwMode="auto">
           <a:xfrm>
-            <a:off x="9832991" y="4148015"/>
+            <a:off x="9832991" y="4417526"/>
             <a:ext cx="1396331" cy="276999"/>
           </a:xfrm>
           <a:prstGeom prst="rect">
@@ -6573,7 +5895,7 @@
           <p:nvPr/>
         </p:nvPicPr>
         <p:blipFill>
-          <a:blip r:embed="rId19">
+          <a:blip r:embed="rId17">
             <a:extLst>
               <a:ext uri="{28A0092B-C50C-407E-A947-70E740481C1C}">
                 <a14:useLocalDpi xmlns:a14="http://schemas.microsoft.com/office/drawing/2010/main" val="0"/>
@@ -6587,7 +5909,7 @@
         </p:blipFill>
         <p:spPr bwMode="auto">
           <a:xfrm>
-            <a:off x="10149840" y="4754880"/>
+            <a:off x="10149840" y="5024391"/>
             <a:ext cx="762000" cy="762000"/>
           </a:xfrm>
           <a:prstGeom prst="rect">
@@ -6634,7 +5956,7 @@
         </p:nvSpPr>
         <p:spPr bwMode="auto">
           <a:xfrm>
-            <a:off x="9926034" y="5518647"/>
+            <a:off x="9926034" y="5788158"/>
             <a:ext cx="1211772" cy="276999"/>
           </a:xfrm>
           <a:prstGeom prst="rect">
@@ -6799,7 +6121,7 @@
           <p:nvPr/>
         </p:nvPicPr>
         <p:blipFill>
-          <a:blip r:embed="rId20">
+          <a:blip r:embed="rId18">
             <a:extLst>
               <a:ext uri="{28A0092B-C50C-407E-A947-70E740481C1C}">
                 <a14:useLocalDpi xmlns:a14="http://schemas.microsoft.com/office/drawing/2010/main" val="0"/>
@@ -6813,7 +6135,7 @@
         </p:blipFill>
         <p:spPr bwMode="auto">
           <a:xfrm>
-            <a:off x="10149840" y="6126480"/>
+            <a:off x="10149840" y="6395991"/>
             <a:ext cx="762000" cy="762000"/>
           </a:xfrm>
           <a:prstGeom prst="rect">
@@ -6860,7 +6182,7 @@
         </p:nvSpPr>
         <p:spPr bwMode="auto">
           <a:xfrm>
-            <a:off x="9925047" y="6891040"/>
+            <a:off x="9925047" y="7160551"/>
             <a:ext cx="1211772" cy="276999"/>
           </a:xfrm>
           <a:prstGeom prst="rect">
@@ -7025,7 +6347,7 @@
         <p:spPr>
           <a:xfrm>
             <a:off x="6035040" y="2001520"/>
-            <a:ext cx="2103120" cy="4846320"/>
+            <a:ext cx="2103120" cy="5303520"/>
           </a:xfrm>
           <a:prstGeom prst="rect">
             <a:avLst/>
@@ -7102,7 +6424,7 @@
         <p:spPr>
           <a:xfrm>
             <a:off x="2468880" y="2001520"/>
-            <a:ext cx="2103120" cy="4846320"/>
+            <a:ext cx="2103120" cy="5303520"/>
           </a:xfrm>
           <a:prstGeom prst="rect">
             <a:avLst/>
@@ -7324,7 +6646,7 @@
           <p:nvPr/>
         </p:nvPicPr>
         <p:blipFill>
-          <a:blip r:embed="rId21">
+          <a:blip r:embed="rId19">
             <a:extLst>
               <a:ext uri="{28A0092B-C50C-407E-A947-70E740481C1C}">
                 <a14:useLocalDpi xmlns:a14="http://schemas.microsoft.com/office/drawing/2010/main" val="0"/>
@@ -7351,6 +6673,1126 @@
             <a:noFill/>
           </a:ln>
           <a:extLst/>
+        </p:spPr>
+      </p:pic>
+      <p:sp>
+        <p:nvSpPr>
+          <p:cNvPr id="40" name="TextBox 19">
+            <a:extLst>
+              <a:ext uri="{FF2B5EF4-FFF2-40B4-BE49-F238E27FC236}">
+                <a16:creationId xmlns:a16="http://schemas.microsoft.com/office/drawing/2014/main" id="{0C086288-FC5C-45E1-9A89-0C93AC2D1C24}"/>
+              </a:ext>
+            </a:extLst>
+          </p:cNvPr>
+          <p:cNvSpPr txBox="1">
+            <a:spLocks noChangeArrowheads="1"/>
+          </p:cNvSpPr>
+          <p:nvPr/>
+        </p:nvSpPr>
+        <p:spPr bwMode="auto">
+          <a:xfrm>
+            <a:off x="4673445" y="3565783"/>
+            <a:ext cx="1252536" cy="430887"/>
+          </a:xfrm>
+          <a:prstGeom prst="rect">
+            <a:avLst/>
+          </a:prstGeom>
+          <a:noFill/>
+          <a:ln>
+            <a:noFill/>
+          </a:ln>
+          <a:extLst>
+            <a:ext uri="{909E8E84-426E-40DD-AFC4-6F175D3DCCD1}">
+              <a14:hiddenFill xmlns:a14="http://schemas.microsoft.com/office/drawing/2010/main">
+                <a:solidFill>
+                  <a:srgbClr val="FFFFFF"/>
+                </a:solidFill>
+              </a14:hiddenFill>
+            </a:ext>
+            <a:ext uri="{91240B29-F687-4F45-9708-019B960494DF}">
+              <a14:hiddenLine xmlns:a14="http://schemas.microsoft.com/office/drawing/2010/main" w="9525">
+                <a:solidFill>
+                  <a:srgbClr val="000000"/>
+                </a:solidFill>
+                <a:miter lim="800000"/>
+                <a:headEnd/>
+                <a:tailEnd/>
+              </a14:hiddenLine>
+            </a:ext>
+          </a:extLst>
+        </p:spPr>
+        <p:txBody>
+          <a:bodyPr wrap="square">
+            <a:spAutoFit/>
+          </a:bodyPr>
+          <a:lstStyle>
+            <a:lvl1pPr>
+              <a:defRPr>
+                <a:solidFill>
+                  <a:schemeClr val="tx1"/>
+                </a:solidFill>
+                <a:latin typeface="Calibri" panose="020F0502020204030204" pitchFamily="34" charset="0"/>
+              </a:defRPr>
+            </a:lvl1pPr>
+            <a:lvl2pPr marL="742950" indent="-285750">
+              <a:defRPr>
+                <a:solidFill>
+                  <a:schemeClr val="tx1"/>
+                </a:solidFill>
+                <a:latin typeface="Calibri" panose="020F0502020204030204" pitchFamily="34" charset="0"/>
+              </a:defRPr>
+            </a:lvl2pPr>
+            <a:lvl3pPr marL="1143000" indent="-228600">
+              <a:defRPr>
+                <a:solidFill>
+                  <a:schemeClr val="tx1"/>
+                </a:solidFill>
+                <a:latin typeface="Calibri" panose="020F0502020204030204" pitchFamily="34" charset="0"/>
+              </a:defRPr>
+            </a:lvl3pPr>
+            <a:lvl4pPr marL="1600200" indent="-228600">
+              <a:defRPr>
+                <a:solidFill>
+                  <a:schemeClr val="tx1"/>
+                </a:solidFill>
+                <a:latin typeface="Calibri" panose="020F0502020204030204" pitchFamily="34" charset="0"/>
+              </a:defRPr>
+            </a:lvl4pPr>
+            <a:lvl5pPr marL="2057400" indent="-228600">
+              <a:defRPr>
+                <a:solidFill>
+                  <a:schemeClr val="tx1"/>
+                </a:solidFill>
+                <a:latin typeface="Calibri" panose="020F0502020204030204" pitchFamily="34" charset="0"/>
+              </a:defRPr>
+            </a:lvl5pPr>
+            <a:lvl6pPr marL="2514600" indent="-228600" eaLnBrk="0" fontAlgn="base" hangingPunct="0">
+              <a:spcBef>
+                <a:spcPct val="0"/>
+              </a:spcBef>
+              <a:spcAft>
+                <a:spcPct val="0"/>
+              </a:spcAft>
+              <a:defRPr>
+                <a:solidFill>
+                  <a:schemeClr val="tx1"/>
+                </a:solidFill>
+                <a:latin typeface="Calibri" panose="020F0502020204030204" pitchFamily="34" charset="0"/>
+              </a:defRPr>
+            </a:lvl6pPr>
+            <a:lvl7pPr marL="2971800" indent="-228600" eaLnBrk="0" fontAlgn="base" hangingPunct="0">
+              <a:spcBef>
+                <a:spcPct val="0"/>
+              </a:spcBef>
+              <a:spcAft>
+                <a:spcPct val="0"/>
+              </a:spcAft>
+              <a:defRPr>
+                <a:solidFill>
+                  <a:schemeClr val="tx1"/>
+                </a:solidFill>
+                <a:latin typeface="Calibri" panose="020F0502020204030204" pitchFamily="34" charset="0"/>
+              </a:defRPr>
+            </a:lvl7pPr>
+            <a:lvl8pPr marL="3429000" indent="-228600" eaLnBrk="0" fontAlgn="base" hangingPunct="0">
+              <a:spcBef>
+                <a:spcPct val="0"/>
+              </a:spcBef>
+              <a:spcAft>
+                <a:spcPct val="0"/>
+              </a:spcAft>
+              <a:defRPr>
+                <a:solidFill>
+                  <a:schemeClr val="tx1"/>
+                </a:solidFill>
+                <a:latin typeface="Calibri" panose="020F0502020204030204" pitchFamily="34" charset="0"/>
+              </a:defRPr>
+            </a:lvl8pPr>
+            <a:lvl9pPr marL="3886200" indent="-228600" eaLnBrk="0" fontAlgn="base" hangingPunct="0">
+              <a:spcBef>
+                <a:spcPct val="0"/>
+              </a:spcBef>
+              <a:spcAft>
+                <a:spcPct val="0"/>
+              </a:spcAft>
+              <a:defRPr>
+                <a:solidFill>
+                  <a:schemeClr val="tx1"/>
+                </a:solidFill>
+                <a:latin typeface="Calibri" panose="020F0502020204030204" pitchFamily="34" charset="0"/>
+              </a:defRPr>
+            </a:lvl9pPr>
+          </a:lstStyle>
+          <a:p>
+            <a:pPr algn="ctr" eaLnBrk="1" hangingPunct="1"/>
+            <a:r>
+              <a:rPr lang="en-US" altLang="en-US" sz="1100" dirty="0">
+                <a:latin typeface="Arial" panose="020B0604020202020204" pitchFamily="34" charset="0"/>
+                <a:ea typeface="Amazon Ember" panose="020B0603020204020204" pitchFamily="34" charset="0"/>
+                <a:cs typeface="Arial" panose="020B0604020202020204" pitchFamily="34" charset="0"/>
+              </a:rPr>
+              <a:t>Application Load </a:t>
+            </a:r>
+            <a:br>
+              <a:rPr lang="en-US" altLang="en-US" sz="1100" dirty="0">
+                <a:latin typeface="Arial" panose="020B0604020202020204" pitchFamily="34" charset="0"/>
+                <a:ea typeface="Amazon Ember" panose="020B0603020204020204" pitchFamily="34" charset="0"/>
+                <a:cs typeface="Arial" panose="020B0604020202020204" pitchFamily="34" charset="0"/>
+              </a:rPr>
+            </a:br>
+            <a:r>
+              <a:rPr lang="en-US" altLang="en-US" sz="1100" dirty="0">
+                <a:latin typeface="Arial" panose="020B0604020202020204" pitchFamily="34" charset="0"/>
+                <a:ea typeface="Amazon Ember" panose="020B0603020204020204" pitchFamily="34" charset="0"/>
+                <a:cs typeface="Arial" panose="020B0604020202020204" pitchFamily="34" charset="0"/>
+              </a:rPr>
+              <a:t>Balancer</a:t>
+            </a:r>
+          </a:p>
+        </p:txBody>
+      </p:sp>
+      <p:pic>
+        <p:nvPicPr>
+          <p:cNvPr id="41" name="Graphic 8">
+            <a:extLst>
+              <a:ext uri="{FF2B5EF4-FFF2-40B4-BE49-F238E27FC236}">
+                <a16:creationId xmlns:a16="http://schemas.microsoft.com/office/drawing/2014/main" id="{7D70FA40-8813-48B1-AE37-574CB1CCCBB5}"/>
+              </a:ext>
+            </a:extLst>
+          </p:cNvPr>
+          <p:cNvPicPr>
+            <a:picLocks noChangeAspect="1" noChangeArrowheads="1"/>
+          </p:cNvPicPr>
+          <p:nvPr/>
+        </p:nvPicPr>
+        <p:blipFill>
+          <a:blip r:embed="rId20">
+            <a:extLst>
+              <a:ext uri="{28A0092B-C50C-407E-A947-70E740481C1C}">
+                <a14:useLocalDpi xmlns:a14="http://schemas.microsoft.com/office/drawing/2010/main" val="0"/>
+              </a:ext>
+            </a:extLst>
+          </a:blip>
+          <a:srcRect/>
+          <a:stretch>
+            <a:fillRect/>
+          </a:stretch>
+        </p:blipFill>
+        <p:spPr bwMode="auto">
+          <a:xfrm>
+            <a:off x="5069840" y="3104931"/>
+            <a:ext cx="457200" cy="457200"/>
+          </a:xfrm>
+          <a:prstGeom prst="rect">
+            <a:avLst/>
+          </a:prstGeom>
+          <a:noFill/>
+          <a:ln>
+            <a:noFill/>
+          </a:ln>
+          <a:extLst>
+            <a:ext uri="{909E8E84-426E-40DD-AFC4-6F175D3DCCD1}">
+              <a14:hiddenFill xmlns:a14="http://schemas.microsoft.com/office/drawing/2010/main">
+                <a:solidFill>
+                  <a:srgbClr val="FFFFFF"/>
+                </a:solidFill>
+              </a14:hiddenFill>
+            </a:ext>
+            <a:ext uri="{91240B29-F687-4F45-9708-019B960494DF}">
+              <a14:hiddenLine xmlns:a14="http://schemas.microsoft.com/office/drawing/2010/main" w="9525">
+                <a:solidFill>
+                  <a:srgbClr val="000000"/>
+                </a:solidFill>
+                <a:miter lim="800000"/>
+                <a:headEnd/>
+                <a:tailEnd/>
+              </a14:hiddenLine>
+            </a:ext>
+          </a:extLst>
+        </p:spPr>
+      </p:pic>
+      <p:pic>
+        <p:nvPicPr>
+          <p:cNvPr id="42" name="Graphic 60">
+            <a:extLst>
+              <a:ext uri="{FF2B5EF4-FFF2-40B4-BE49-F238E27FC236}">
+                <a16:creationId xmlns:a16="http://schemas.microsoft.com/office/drawing/2014/main" id="{572A2A19-DFEF-499B-B2AB-2CDB909B196C}"/>
+              </a:ext>
+            </a:extLst>
+          </p:cNvPr>
+          <p:cNvPicPr>
+            <a:picLocks noChangeAspect="1" noChangeArrowheads="1"/>
+          </p:cNvPicPr>
+          <p:nvPr/>
+        </p:nvPicPr>
+        <p:blipFill>
+          <a:blip r:embed="rId21">
+            <a:extLst>
+              <a:ext uri="{28A0092B-C50C-407E-A947-70E740481C1C}">
+                <a14:useLocalDpi xmlns:a14="http://schemas.microsoft.com/office/drawing/2010/main" val="0"/>
+              </a:ext>
+            </a:extLst>
+          </a:blip>
+          <a:srcRect/>
+          <a:stretch>
+            <a:fillRect/>
+          </a:stretch>
+        </p:blipFill>
+        <p:spPr bwMode="auto">
+          <a:xfrm>
+            <a:off x="3291840" y="4937760"/>
+            <a:ext cx="457200" cy="457200"/>
+          </a:xfrm>
+          <a:prstGeom prst="rect">
+            <a:avLst/>
+          </a:prstGeom>
+          <a:noFill/>
+          <a:ln>
+            <a:noFill/>
+          </a:ln>
+          <a:extLst>
+            <a:ext uri="{909E8E84-426E-40DD-AFC4-6F175D3DCCD1}">
+              <a14:hiddenFill xmlns:a14="http://schemas.microsoft.com/office/drawing/2010/main">
+                <a:solidFill>
+                  <a:srgbClr val="FFFFFF"/>
+                </a:solidFill>
+              </a14:hiddenFill>
+            </a:ext>
+            <a:ext uri="{91240B29-F687-4F45-9708-019B960494DF}">
+              <a14:hiddenLine xmlns:a14="http://schemas.microsoft.com/office/drawing/2010/main" w="9525">
+                <a:solidFill>
+                  <a:srgbClr val="000000"/>
+                </a:solidFill>
+                <a:miter lim="800000"/>
+                <a:headEnd/>
+                <a:tailEnd/>
+              </a14:hiddenLine>
+            </a:ext>
+          </a:extLst>
+        </p:spPr>
+      </p:pic>
+      <p:sp>
+        <p:nvSpPr>
+          <p:cNvPr id="43" name="TextBox 16">
+            <a:extLst>
+              <a:ext uri="{FF2B5EF4-FFF2-40B4-BE49-F238E27FC236}">
+                <a16:creationId xmlns:a16="http://schemas.microsoft.com/office/drawing/2014/main" id="{9C8CADF3-F6DB-4C0E-9213-4ECC9CDBED72}"/>
+              </a:ext>
+            </a:extLst>
+          </p:cNvPr>
+          <p:cNvSpPr txBox="1">
+            <a:spLocks noChangeArrowheads="1"/>
+          </p:cNvSpPr>
+          <p:nvPr/>
+        </p:nvSpPr>
+        <p:spPr bwMode="auto">
+          <a:xfrm>
+            <a:off x="2963783" y="5394960"/>
+            <a:ext cx="1115568" cy="261610"/>
+          </a:xfrm>
+          <a:prstGeom prst="rect">
+            <a:avLst/>
+          </a:prstGeom>
+          <a:noFill/>
+          <a:ln>
+            <a:noFill/>
+          </a:ln>
+          <a:extLst>
+            <a:ext uri="{909E8E84-426E-40DD-AFC4-6F175D3DCCD1}">
+              <a14:hiddenFill xmlns:a14="http://schemas.microsoft.com/office/drawing/2010/main">
+                <a:solidFill>
+                  <a:srgbClr val="FFFFFF"/>
+                </a:solidFill>
+              </a14:hiddenFill>
+            </a:ext>
+            <a:ext uri="{91240B29-F687-4F45-9708-019B960494DF}">
+              <a14:hiddenLine xmlns:a14="http://schemas.microsoft.com/office/drawing/2010/main" w="9525">
+                <a:solidFill>
+                  <a:srgbClr val="000000"/>
+                </a:solidFill>
+                <a:miter lim="800000"/>
+                <a:headEnd/>
+                <a:tailEnd/>
+              </a14:hiddenLine>
+            </a:ext>
+          </a:extLst>
+        </p:spPr>
+        <p:txBody>
+          <a:bodyPr wrap="square" lIns="0" rIns="0">
+            <a:spAutoFit/>
+          </a:bodyPr>
+          <a:lstStyle>
+            <a:lvl1pPr>
+              <a:defRPr>
+                <a:solidFill>
+                  <a:schemeClr val="tx1"/>
+                </a:solidFill>
+                <a:latin typeface="Calibri" panose="020F0502020204030204" pitchFamily="34" charset="0"/>
+              </a:defRPr>
+            </a:lvl1pPr>
+            <a:lvl2pPr marL="742950" indent="-285750">
+              <a:defRPr>
+                <a:solidFill>
+                  <a:schemeClr val="tx1"/>
+                </a:solidFill>
+                <a:latin typeface="Calibri" panose="020F0502020204030204" pitchFamily="34" charset="0"/>
+              </a:defRPr>
+            </a:lvl2pPr>
+            <a:lvl3pPr marL="1143000" indent="-228600">
+              <a:defRPr>
+                <a:solidFill>
+                  <a:schemeClr val="tx1"/>
+                </a:solidFill>
+                <a:latin typeface="Calibri" panose="020F0502020204030204" pitchFamily="34" charset="0"/>
+              </a:defRPr>
+            </a:lvl3pPr>
+            <a:lvl4pPr marL="1600200" indent="-228600">
+              <a:defRPr>
+                <a:solidFill>
+                  <a:schemeClr val="tx1"/>
+                </a:solidFill>
+                <a:latin typeface="Calibri" panose="020F0502020204030204" pitchFamily="34" charset="0"/>
+              </a:defRPr>
+            </a:lvl4pPr>
+            <a:lvl5pPr marL="2057400" indent="-228600">
+              <a:defRPr>
+                <a:solidFill>
+                  <a:schemeClr val="tx1"/>
+                </a:solidFill>
+                <a:latin typeface="Calibri" panose="020F0502020204030204" pitchFamily="34" charset="0"/>
+              </a:defRPr>
+            </a:lvl5pPr>
+            <a:lvl6pPr marL="2514600" indent="-228600" eaLnBrk="0" fontAlgn="base" hangingPunct="0">
+              <a:spcBef>
+                <a:spcPct val="0"/>
+              </a:spcBef>
+              <a:spcAft>
+                <a:spcPct val="0"/>
+              </a:spcAft>
+              <a:defRPr>
+                <a:solidFill>
+                  <a:schemeClr val="tx1"/>
+                </a:solidFill>
+                <a:latin typeface="Calibri" panose="020F0502020204030204" pitchFamily="34" charset="0"/>
+              </a:defRPr>
+            </a:lvl6pPr>
+            <a:lvl7pPr marL="2971800" indent="-228600" eaLnBrk="0" fontAlgn="base" hangingPunct="0">
+              <a:spcBef>
+                <a:spcPct val="0"/>
+              </a:spcBef>
+              <a:spcAft>
+                <a:spcPct val="0"/>
+              </a:spcAft>
+              <a:defRPr>
+                <a:solidFill>
+                  <a:schemeClr val="tx1"/>
+                </a:solidFill>
+                <a:latin typeface="Calibri" panose="020F0502020204030204" pitchFamily="34" charset="0"/>
+              </a:defRPr>
+            </a:lvl7pPr>
+            <a:lvl8pPr marL="3429000" indent="-228600" eaLnBrk="0" fontAlgn="base" hangingPunct="0">
+              <a:spcBef>
+                <a:spcPct val="0"/>
+              </a:spcBef>
+              <a:spcAft>
+                <a:spcPct val="0"/>
+              </a:spcAft>
+              <a:defRPr>
+                <a:solidFill>
+                  <a:schemeClr val="tx1"/>
+                </a:solidFill>
+                <a:latin typeface="Calibri" panose="020F0502020204030204" pitchFamily="34" charset="0"/>
+              </a:defRPr>
+            </a:lvl8pPr>
+            <a:lvl9pPr marL="3886200" indent="-228600" eaLnBrk="0" fontAlgn="base" hangingPunct="0">
+              <a:spcBef>
+                <a:spcPct val="0"/>
+              </a:spcBef>
+              <a:spcAft>
+                <a:spcPct val="0"/>
+              </a:spcAft>
+              <a:defRPr>
+                <a:solidFill>
+                  <a:schemeClr val="tx1"/>
+                </a:solidFill>
+                <a:latin typeface="Calibri" panose="020F0502020204030204" pitchFamily="34" charset="0"/>
+              </a:defRPr>
+            </a:lvl9pPr>
+          </a:lstStyle>
+          <a:p>
+            <a:pPr algn="ctr" eaLnBrk="1" hangingPunct="1"/>
+            <a:r>
+              <a:rPr lang="en-US" altLang="en-US" sz="1100" dirty="0">
+                <a:latin typeface="Arial" panose="020B0604020202020204" pitchFamily="34" charset="0"/>
+                <a:ea typeface="Amazon Ember" panose="020B0603020204020204" pitchFamily="34" charset="0"/>
+                <a:cs typeface="Arial" panose="020B0604020202020204" pitchFamily="34" charset="0"/>
+              </a:rPr>
+              <a:t>Instance</a:t>
+            </a:r>
+          </a:p>
+        </p:txBody>
+      </p:sp>
+      <p:pic>
+        <p:nvPicPr>
+          <p:cNvPr id="45" name="Graphic 60">
+            <a:extLst>
+              <a:ext uri="{FF2B5EF4-FFF2-40B4-BE49-F238E27FC236}">
+                <a16:creationId xmlns:a16="http://schemas.microsoft.com/office/drawing/2014/main" id="{8AB11BD1-2859-440D-91FA-8575AD868A31}"/>
+              </a:ext>
+            </a:extLst>
+          </p:cNvPr>
+          <p:cNvPicPr>
+            <a:picLocks noChangeAspect="1" noChangeArrowheads="1"/>
+          </p:cNvPicPr>
+          <p:nvPr/>
+        </p:nvPicPr>
+        <p:blipFill>
+          <a:blip r:embed="rId21">
+            <a:extLst>
+              <a:ext uri="{28A0092B-C50C-407E-A947-70E740481C1C}">
+                <a14:useLocalDpi xmlns:a14="http://schemas.microsoft.com/office/drawing/2010/main" val="0"/>
+              </a:ext>
+            </a:extLst>
+          </a:blip>
+          <a:srcRect/>
+          <a:stretch>
+            <a:fillRect/>
+          </a:stretch>
+        </p:blipFill>
+        <p:spPr bwMode="auto">
+          <a:xfrm>
+            <a:off x="6858000" y="4937760"/>
+            <a:ext cx="457200" cy="457200"/>
+          </a:xfrm>
+          <a:prstGeom prst="rect">
+            <a:avLst/>
+          </a:prstGeom>
+          <a:noFill/>
+          <a:ln>
+            <a:noFill/>
+          </a:ln>
+          <a:extLst>
+            <a:ext uri="{909E8E84-426E-40DD-AFC4-6F175D3DCCD1}">
+              <a14:hiddenFill xmlns:a14="http://schemas.microsoft.com/office/drawing/2010/main">
+                <a:solidFill>
+                  <a:srgbClr val="FFFFFF"/>
+                </a:solidFill>
+              </a14:hiddenFill>
+            </a:ext>
+            <a:ext uri="{91240B29-F687-4F45-9708-019B960494DF}">
+              <a14:hiddenLine xmlns:a14="http://schemas.microsoft.com/office/drawing/2010/main" w="9525">
+                <a:solidFill>
+                  <a:srgbClr val="000000"/>
+                </a:solidFill>
+                <a:miter lim="800000"/>
+                <a:headEnd/>
+                <a:tailEnd/>
+              </a14:hiddenLine>
+            </a:ext>
+          </a:extLst>
+        </p:spPr>
+      </p:pic>
+      <p:sp>
+        <p:nvSpPr>
+          <p:cNvPr id="46" name="TextBox 16">
+            <a:extLst>
+              <a:ext uri="{FF2B5EF4-FFF2-40B4-BE49-F238E27FC236}">
+                <a16:creationId xmlns:a16="http://schemas.microsoft.com/office/drawing/2014/main" id="{DD87D687-AE99-465F-82D2-8A15291BCF7C}"/>
+              </a:ext>
+            </a:extLst>
+          </p:cNvPr>
+          <p:cNvSpPr txBox="1">
+            <a:spLocks noChangeArrowheads="1"/>
+          </p:cNvSpPr>
+          <p:nvPr/>
+        </p:nvSpPr>
+        <p:spPr bwMode="auto">
+          <a:xfrm>
+            <a:off x="6529102" y="5397341"/>
+            <a:ext cx="1115568" cy="261610"/>
+          </a:xfrm>
+          <a:prstGeom prst="rect">
+            <a:avLst/>
+          </a:prstGeom>
+          <a:noFill/>
+          <a:ln>
+            <a:noFill/>
+          </a:ln>
+          <a:extLst>
+            <a:ext uri="{909E8E84-426E-40DD-AFC4-6F175D3DCCD1}">
+              <a14:hiddenFill xmlns:a14="http://schemas.microsoft.com/office/drawing/2010/main">
+                <a:solidFill>
+                  <a:srgbClr val="FFFFFF"/>
+                </a:solidFill>
+              </a14:hiddenFill>
+            </a:ext>
+            <a:ext uri="{91240B29-F687-4F45-9708-019B960494DF}">
+              <a14:hiddenLine xmlns:a14="http://schemas.microsoft.com/office/drawing/2010/main" w="9525">
+                <a:solidFill>
+                  <a:srgbClr val="000000"/>
+                </a:solidFill>
+                <a:miter lim="800000"/>
+                <a:headEnd/>
+                <a:tailEnd/>
+              </a14:hiddenLine>
+            </a:ext>
+          </a:extLst>
+        </p:spPr>
+        <p:txBody>
+          <a:bodyPr wrap="square" lIns="0" rIns="0">
+            <a:spAutoFit/>
+          </a:bodyPr>
+          <a:lstStyle>
+            <a:lvl1pPr>
+              <a:defRPr>
+                <a:solidFill>
+                  <a:schemeClr val="tx1"/>
+                </a:solidFill>
+                <a:latin typeface="Calibri" panose="020F0502020204030204" pitchFamily="34" charset="0"/>
+              </a:defRPr>
+            </a:lvl1pPr>
+            <a:lvl2pPr marL="742950" indent="-285750">
+              <a:defRPr>
+                <a:solidFill>
+                  <a:schemeClr val="tx1"/>
+                </a:solidFill>
+                <a:latin typeface="Calibri" panose="020F0502020204030204" pitchFamily="34" charset="0"/>
+              </a:defRPr>
+            </a:lvl2pPr>
+            <a:lvl3pPr marL="1143000" indent="-228600">
+              <a:defRPr>
+                <a:solidFill>
+                  <a:schemeClr val="tx1"/>
+                </a:solidFill>
+                <a:latin typeface="Calibri" panose="020F0502020204030204" pitchFamily="34" charset="0"/>
+              </a:defRPr>
+            </a:lvl3pPr>
+            <a:lvl4pPr marL="1600200" indent="-228600">
+              <a:defRPr>
+                <a:solidFill>
+                  <a:schemeClr val="tx1"/>
+                </a:solidFill>
+                <a:latin typeface="Calibri" panose="020F0502020204030204" pitchFamily="34" charset="0"/>
+              </a:defRPr>
+            </a:lvl4pPr>
+            <a:lvl5pPr marL="2057400" indent="-228600">
+              <a:defRPr>
+                <a:solidFill>
+                  <a:schemeClr val="tx1"/>
+                </a:solidFill>
+                <a:latin typeface="Calibri" panose="020F0502020204030204" pitchFamily="34" charset="0"/>
+              </a:defRPr>
+            </a:lvl5pPr>
+            <a:lvl6pPr marL="2514600" indent="-228600" eaLnBrk="0" fontAlgn="base" hangingPunct="0">
+              <a:spcBef>
+                <a:spcPct val="0"/>
+              </a:spcBef>
+              <a:spcAft>
+                <a:spcPct val="0"/>
+              </a:spcAft>
+              <a:defRPr>
+                <a:solidFill>
+                  <a:schemeClr val="tx1"/>
+                </a:solidFill>
+                <a:latin typeface="Calibri" panose="020F0502020204030204" pitchFamily="34" charset="0"/>
+              </a:defRPr>
+            </a:lvl6pPr>
+            <a:lvl7pPr marL="2971800" indent="-228600" eaLnBrk="0" fontAlgn="base" hangingPunct="0">
+              <a:spcBef>
+                <a:spcPct val="0"/>
+              </a:spcBef>
+              <a:spcAft>
+                <a:spcPct val="0"/>
+              </a:spcAft>
+              <a:defRPr>
+                <a:solidFill>
+                  <a:schemeClr val="tx1"/>
+                </a:solidFill>
+                <a:latin typeface="Calibri" panose="020F0502020204030204" pitchFamily="34" charset="0"/>
+              </a:defRPr>
+            </a:lvl7pPr>
+            <a:lvl8pPr marL="3429000" indent="-228600" eaLnBrk="0" fontAlgn="base" hangingPunct="0">
+              <a:spcBef>
+                <a:spcPct val="0"/>
+              </a:spcBef>
+              <a:spcAft>
+                <a:spcPct val="0"/>
+              </a:spcAft>
+              <a:defRPr>
+                <a:solidFill>
+                  <a:schemeClr val="tx1"/>
+                </a:solidFill>
+                <a:latin typeface="Calibri" panose="020F0502020204030204" pitchFamily="34" charset="0"/>
+              </a:defRPr>
+            </a:lvl8pPr>
+            <a:lvl9pPr marL="3886200" indent="-228600" eaLnBrk="0" fontAlgn="base" hangingPunct="0">
+              <a:spcBef>
+                <a:spcPct val="0"/>
+              </a:spcBef>
+              <a:spcAft>
+                <a:spcPct val="0"/>
+              </a:spcAft>
+              <a:defRPr>
+                <a:solidFill>
+                  <a:schemeClr val="tx1"/>
+                </a:solidFill>
+                <a:latin typeface="Calibri" panose="020F0502020204030204" pitchFamily="34" charset="0"/>
+              </a:defRPr>
+            </a:lvl9pPr>
+          </a:lstStyle>
+          <a:p>
+            <a:pPr algn="ctr" eaLnBrk="1" hangingPunct="1"/>
+            <a:r>
+              <a:rPr lang="en-US" altLang="en-US" sz="1100" dirty="0">
+                <a:latin typeface="Arial" panose="020B0604020202020204" pitchFamily="34" charset="0"/>
+                <a:ea typeface="Amazon Ember" panose="020B0603020204020204" pitchFamily="34" charset="0"/>
+                <a:cs typeface="Arial" panose="020B0604020202020204" pitchFamily="34" charset="0"/>
+              </a:rPr>
+              <a:t>Instance</a:t>
+            </a:r>
+          </a:p>
+        </p:txBody>
+      </p:sp>
+      <p:sp>
+        <p:nvSpPr>
+          <p:cNvPr id="47" name="TextBox 6">
+            <a:extLst>
+              <a:ext uri="{FF2B5EF4-FFF2-40B4-BE49-F238E27FC236}">
+                <a16:creationId xmlns:a16="http://schemas.microsoft.com/office/drawing/2014/main" id="{67F77F36-AA7E-4C46-9282-B201CC7A10C3}"/>
+              </a:ext>
+            </a:extLst>
+          </p:cNvPr>
+          <p:cNvSpPr txBox="1">
+            <a:spLocks noChangeArrowheads="1"/>
+          </p:cNvSpPr>
+          <p:nvPr/>
+        </p:nvSpPr>
+        <p:spPr bwMode="auto">
+          <a:xfrm>
+            <a:off x="2764426" y="6494799"/>
+            <a:ext cx="1511300" cy="430887"/>
+          </a:xfrm>
+          <a:prstGeom prst="rect">
+            <a:avLst/>
+          </a:prstGeom>
+          <a:noFill/>
+          <a:ln>
+            <a:noFill/>
+          </a:ln>
+          <a:extLst>
+            <a:ext uri="{909E8E84-426E-40DD-AFC4-6F175D3DCCD1}">
+              <a14:hiddenFill xmlns:a14="http://schemas.microsoft.com/office/drawing/2010/main">
+                <a:solidFill>
+                  <a:srgbClr val="FFFFFF"/>
+                </a:solidFill>
+              </a14:hiddenFill>
+            </a:ext>
+            <a:ext uri="{91240B29-F687-4F45-9708-019B960494DF}">
+              <a14:hiddenLine xmlns:a14="http://schemas.microsoft.com/office/drawing/2010/main" w="9525">
+                <a:solidFill>
+                  <a:srgbClr val="000000"/>
+                </a:solidFill>
+                <a:miter lim="800000"/>
+                <a:headEnd/>
+                <a:tailEnd/>
+              </a14:hiddenLine>
+            </a:ext>
+          </a:extLst>
+        </p:spPr>
+        <p:txBody>
+          <a:bodyPr>
+            <a:spAutoFit/>
+          </a:bodyPr>
+          <a:lstStyle>
+            <a:lvl1pPr>
+              <a:defRPr>
+                <a:solidFill>
+                  <a:schemeClr val="tx1"/>
+                </a:solidFill>
+                <a:latin typeface="Calibri" panose="020F0502020204030204" pitchFamily="34" charset="0"/>
+              </a:defRPr>
+            </a:lvl1pPr>
+            <a:lvl2pPr marL="742950" indent="-285750">
+              <a:defRPr>
+                <a:solidFill>
+                  <a:schemeClr val="tx1"/>
+                </a:solidFill>
+                <a:latin typeface="Calibri" panose="020F0502020204030204" pitchFamily="34" charset="0"/>
+              </a:defRPr>
+            </a:lvl2pPr>
+            <a:lvl3pPr marL="1143000" indent="-228600">
+              <a:defRPr>
+                <a:solidFill>
+                  <a:schemeClr val="tx1"/>
+                </a:solidFill>
+                <a:latin typeface="Calibri" panose="020F0502020204030204" pitchFamily="34" charset="0"/>
+              </a:defRPr>
+            </a:lvl3pPr>
+            <a:lvl4pPr marL="1600200" indent="-228600">
+              <a:defRPr>
+                <a:solidFill>
+                  <a:schemeClr val="tx1"/>
+                </a:solidFill>
+                <a:latin typeface="Calibri" panose="020F0502020204030204" pitchFamily="34" charset="0"/>
+              </a:defRPr>
+            </a:lvl4pPr>
+            <a:lvl5pPr marL="2057400" indent="-228600">
+              <a:defRPr>
+                <a:solidFill>
+                  <a:schemeClr val="tx1"/>
+                </a:solidFill>
+                <a:latin typeface="Calibri" panose="020F0502020204030204" pitchFamily="34" charset="0"/>
+              </a:defRPr>
+            </a:lvl5pPr>
+            <a:lvl6pPr marL="2514600" indent="-228600" eaLnBrk="0" fontAlgn="base" hangingPunct="0">
+              <a:spcBef>
+                <a:spcPct val="0"/>
+              </a:spcBef>
+              <a:spcAft>
+                <a:spcPct val="0"/>
+              </a:spcAft>
+              <a:defRPr>
+                <a:solidFill>
+                  <a:schemeClr val="tx1"/>
+                </a:solidFill>
+                <a:latin typeface="Calibri" panose="020F0502020204030204" pitchFamily="34" charset="0"/>
+              </a:defRPr>
+            </a:lvl6pPr>
+            <a:lvl7pPr marL="2971800" indent="-228600" eaLnBrk="0" fontAlgn="base" hangingPunct="0">
+              <a:spcBef>
+                <a:spcPct val="0"/>
+              </a:spcBef>
+              <a:spcAft>
+                <a:spcPct val="0"/>
+              </a:spcAft>
+              <a:defRPr>
+                <a:solidFill>
+                  <a:schemeClr val="tx1"/>
+                </a:solidFill>
+                <a:latin typeface="Calibri" panose="020F0502020204030204" pitchFamily="34" charset="0"/>
+              </a:defRPr>
+            </a:lvl7pPr>
+            <a:lvl8pPr marL="3429000" indent="-228600" eaLnBrk="0" fontAlgn="base" hangingPunct="0">
+              <a:spcBef>
+                <a:spcPct val="0"/>
+              </a:spcBef>
+              <a:spcAft>
+                <a:spcPct val="0"/>
+              </a:spcAft>
+              <a:defRPr>
+                <a:solidFill>
+                  <a:schemeClr val="tx1"/>
+                </a:solidFill>
+                <a:latin typeface="Calibri" panose="020F0502020204030204" pitchFamily="34" charset="0"/>
+              </a:defRPr>
+            </a:lvl8pPr>
+            <a:lvl9pPr marL="3886200" indent="-228600" eaLnBrk="0" fontAlgn="base" hangingPunct="0">
+              <a:spcBef>
+                <a:spcPct val="0"/>
+              </a:spcBef>
+              <a:spcAft>
+                <a:spcPct val="0"/>
+              </a:spcAft>
+              <a:defRPr>
+                <a:solidFill>
+                  <a:schemeClr val="tx1"/>
+                </a:solidFill>
+                <a:latin typeface="Calibri" panose="020F0502020204030204" pitchFamily="34" charset="0"/>
+              </a:defRPr>
+            </a:lvl9pPr>
+          </a:lstStyle>
+          <a:p>
+            <a:pPr algn="ctr" eaLnBrk="1" hangingPunct="1"/>
+            <a:r>
+              <a:rPr lang="en-US" altLang="en-US" sz="1100" dirty="0">
+                <a:latin typeface="Arial" panose="020B0604020202020204" pitchFamily="34" charset="0"/>
+                <a:ea typeface="Amazon Ember" panose="020B0603020204020204" pitchFamily="34" charset="0"/>
+                <a:cs typeface="Arial" panose="020B0604020202020204" pitchFamily="34" charset="0"/>
+              </a:rPr>
+              <a:t>Amazon RDS instance</a:t>
+            </a:r>
+          </a:p>
+        </p:txBody>
+      </p:sp>
+      <p:pic>
+        <p:nvPicPr>
+          <p:cNvPr id="48" name="Graphic 37">
+            <a:extLst>
+              <a:ext uri="{FF2B5EF4-FFF2-40B4-BE49-F238E27FC236}">
+                <a16:creationId xmlns:a16="http://schemas.microsoft.com/office/drawing/2014/main" id="{0196200A-3C54-4A83-BEF5-4F7F3C457F25}"/>
+              </a:ext>
+            </a:extLst>
+          </p:cNvPr>
+          <p:cNvPicPr>
+            <a:picLocks noChangeAspect="1" noChangeArrowheads="1"/>
+          </p:cNvPicPr>
+          <p:nvPr/>
+        </p:nvPicPr>
+        <p:blipFill>
+          <a:blip r:embed="rId22">
+            <a:extLst>
+              <a:ext uri="{28A0092B-C50C-407E-A947-70E740481C1C}">
+                <a14:useLocalDpi xmlns:a14="http://schemas.microsoft.com/office/drawing/2010/main" val="0"/>
+              </a:ext>
+            </a:extLst>
+          </a:blip>
+          <a:srcRect/>
+          <a:stretch>
+            <a:fillRect/>
+          </a:stretch>
+        </p:blipFill>
+        <p:spPr bwMode="auto">
+          <a:xfrm>
+            <a:off x="3291476" y="6035040"/>
+            <a:ext cx="457200" cy="457200"/>
+          </a:xfrm>
+          <a:prstGeom prst="rect">
+            <a:avLst/>
+          </a:prstGeom>
+          <a:noFill/>
+          <a:ln>
+            <a:noFill/>
+          </a:ln>
+          <a:extLst>
+            <a:ext uri="{909E8E84-426E-40DD-AFC4-6F175D3DCCD1}">
+              <a14:hiddenFill xmlns:a14="http://schemas.microsoft.com/office/drawing/2010/main">
+                <a:solidFill>
+                  <a:srgbClr val="FFFFFF"/>
+                </a:solidFill>
+              </a14:hiddenFill>
+            </a:ext>
+            <a:ext uri="{91240B29-F687-4F45-9708-019B960494DF}">
+              <a14:hiddenLine xmlns:a14="http://schemas.microsoft.com/office/drawing/2010/main" w="9525">
+                <a:solidFill>
+                  <a:srgbClr val="000000"/>
+                </a:solidFill>
+                <a:miter lim="800000"/>
+                <a:headEnd/>
+                <a:tailEnd/>
+              </a14:hiddenLine>
+            </a:ext>
+          </a:extLst>
+        </p:spPr>
+      </p:pic>
+      <p:sp>
+        <p:nvSpPr>
+          <p:cNvPr id="49" name="TextBox 6">
+            <a:extLst>
+              <a:ext uri="{FF2B5EF4-FFF2-40B4-BE49-F238E27FC236}">
+                <a16:creationId xmlns:a16="http://schemas.microsoft.com/office/drawing/2014/main" id="{1F11A676-CA56-402A-9CAE-E2C00D84A030}"/>
+              </a:ext>
+            </a:extLst>
+          </p:cNvPr>
+          <p:cNvSpPr txBox="1">
+            <a:spLocks noChangeArrowheads="1"/>
+          </p:cNvSpPr>
+          <p:nvPr/>
+        </p:nvSpPr>
+        <p:spPr bwMode="auto">
+          <a:xfrm>
+            <a:off x="6332849" y="6497009"/>
+            <a:ext cx="1511300" cy="430887"/>
+          </a:xfrm>
+          <a:prstGeom prst="rect">
+            <a:avLst/>
+          </a:prstGeom>
+          <a:noFill/>
+          <a:ln>
+            <a:noFill/>
+          </a:ln>
+          <a:extLst>
+            <a:ext uri="{909E8E84-426E-40DD-AFC4-6F175D3DCCD1}">
+              <a14:hiddenFill xmlns:a14="http://schemas.microsoft.com/office/drawing/2010/main">
+                <a:solidFill>
+                  <a:srgbClr val="FFFFFF"/>
+                </a:solidFill>
+              </a14:hiddenFill>
+            </a:ext>
+            <a:ext uri="{91240B29-F687-4F45-9708-019B960494DF}">
+              <a14:hiddenLine xmlns:a14="http://schemas.microsoft.com/office/drawing/2010/main" w="9525">
+                <a:solidFill>
+                  <a:srgbClr val="000000"/>
+                </a:solidFill>
+                <a:miter lim="800000"/>
+                <a:headEnd/>
+                <a:tailEnd/>
+              </a14:hiddenLine>
+            </a:ext>
+          </a:extLst>
+        </p:spPr>
+        <p:txBody>
+          <a:bodyPr>
+            <a:spAutoFit/>
+          </a:bodyPr>
+          <a:lstStyle>
+            <a:lvl1pPr>
+              <a:defRPr>
+                <a:solidFill>
+                  <a:schemeClr val="tx1"/>
+                </a:solidFill>
+                <a:latin typeface="Calibri" panose="020F0502020204030204" pitchFamily="34" charset="0"/>
+              </a:defRPr>
+            </a:lvl1pPr>
+            <a:lvl2pPr marL="742950" indent="-285750">
+              <a:defRPr>
+                <a:solidFill>
+                  <a:schemeClr val="tx1"/>
+                </a:solidFill>
+                <a:latin typeface="Calibri" panose="020F0502020204030204" pitchFamily="34" charset="0"/>
+              </a:defRPr>
+            </a:lvl2pPr>
+            <a:lvl3pPr marL="1143000" indent="-228600">
+              <a:defRPr>
+                <a:solidFill>
+                  <a:schemeClr val="tx1"/>
+                </a:solidFill>
+                <a:latin typeface="Calibri" panose="020F0502020204030204" pitchFamily="34" charset="0"/>
+              </a:defRPr>
+            </a:lvl3pPr>
+            <a:lvl4pPr marL="1600200" indent="-228600">
+              <a:defRPr>
+                <a:solidFill>
+                  <a:schemeClr val="tx1"/>
+                </a:solidFill>
+                <a:latin typeface="Calibri" panose="020F0502020204030204" pitchFamily="34" charset="0"/>
+              </a:defRPr>
+            </a:lvl4pPr>
+            <a:lvl5pPr marL="2057400" indent="-228600">
+              <a:defRPr>
+                <a:solidFill>
+                  <a:schemeClr val="tx1"/>
+                </a:solidFill>
+                <a:latin typeface="Calibri" panose="020F0502020204030204" pitchFamily="34" charset="0"/>
+              </a:defRPr>
+            </a:lvl5pPr>
+            <a:lvl6pPr marL="2514600" indent="-228600" eaLnBrk="0" fontAlgn="base" hangingPunct="0">
+              <a:spcBef>
+                <a:spcPct val="0"/>
+              </a:spcBef>
+              <a:spcAft>
+                <a:spcPct val="0"/>
+              </a:spcAft>
+              <a:defRPr>
+                <a:solidFill>
+                  <a:schemeClr val="tx1"/>
+                </a:solidFill>
+                <a:latin typeface="Calibri" panose="020F0502020204030204" pitchFamily="34" charset="0"/>
+              </a:defRPr>
+            </a:lvl6pPr>
+            <a:lvl7pPr marL="2971800" indent="-228600" eaLnBrk="0" fontAlgn="base" hangingPunct="0">
+              <a:spcBef>
+                <a:spcPct val="0"/>
+              </a:spcBef>
+              <a:spcAft>
+                <a:spcPct val="0"/>
+              </a:spcAft>
+              <a:defRPr>
+                <a:solidFill>
+                  <a:schemeClr val="tx1"/>
+                </a:solidFill>
+                <a:latin typeface="Calibri" panose="020F0502020204030204" pitchFamily="34" charset="0"/>
+              </a:defRPr>
+            </a:lvl7pPr>
+            <a:lvl8pPr marL="3429000" indent="-228600" eaLnBrk="0" fontAlgn="base" hangingPunct="0">
+              <a:spcBef>
+                <a:spcPct val="0"/>
+              </a:spcBef>
+              <a:spcAft>
+                <a:spcPct val="0"/>
+              </a:spcAft>
+              <a:defRPr>
+                <a:solidFill>
+                  <a:schemeClr val="tx1"/>
+                </a:solidFill>
+                <a:latin typeface="Calibri" panose="020F0502020204030204" pitchFamily="34" charset="0"/>
+              </a:defRPr>
+            </a:lvl8pPr>
+            <a:lvl9pPr marL="3886200" indent="-228600" eaLnBrk="0" fontAlgn="base" hangingPunct="0">
+              <a:spcBef>
+                <a:spcPct val="0"/>
+              </a:spcBef>
+              <a:spcAft>
+                <a:spcPct val="0"/>
+              </a:spcAft>
+              <a:defRPr>
+                <a:solidFill>
+                  <a:schemeClr val="tx1"/>
+                </a:solidFill>
+                <a:latin typeface="Calibri" panose="020F0502020204030204" pitchFamily="34" charset="0"/>
+              </a:defRPr>
+            </a:lvl9pPr>
+          </a:lstStyle>
+          <a:p>
+            <a:pPr algn="ctr" eaLnBrk="1" hangingPunct="1"/>
+            <a:r>
+              <a:rPr lang="en-US" altLang="en-US" sz="1100" dirty="0">
+                <a:latin typeface="Arial" panose="020B0604020202020204" pitchFamily="34" charset="0"/>
+                <a:ea typeface="Amazon Ember" panose="020B0603020204020204" pitchFamily="34" charset="0"/>
+                <a:cs typeface="Arial" panose="020B0604020202020204" pitchFamily="34" charset="0"/>
+              </a:rPr>
+              <a:t>Amazon RDS instance</a:t>
+            </a:r>
+          </a:p>
+        </p:txBody>
+      </p:sp>
+      <p:pic>
+        <p:nvPicPr>
+          <p:cNvPr id="50" name="Graphic 37">
+            <a:extLst>
+              <a:ext uri="{FF2B5EF4-FFF2-40B4-BE49-F238E27FC236}">
+                <a16:creationId xmlns:a16="http://schemas.microsoft.com/office/drawing/2014/main" id="{53AD7B01-FE5F-4DD2-860A-02F04290AC75}"/>
+              </a:ext>
+            </a:extLst>
+          </p:cNvPr>
+          <p:cNvPicPr>
+            <a:picLocks noChangeAspect="1" noChangeArrowheads="1"/>
+          </p:cNvPicPr>
+          <p:nvPr/>
+        </p:nvPicPr>
+        <p:blipFill>
+          <a:blip r:embed="rId22">
+            <a:extLst>
+              <a:ext uri="{28A0092B-C50C-407E-A947-70E740481C1C}">
+                <a14:useLocalDpi xmlns:a14="http://schemas.microsoft.com/office/drawing/2010/main" val="0"/>
+              </a:ext>
+            </a:extLst>
+          </a:blip>
+          <a:srcRect/>
+          <a:stretch>
+            <a:fillRect/>
+          </a:stretch>
+        </p:blipFill>
+        <p:spPr bwMode="auto">
+          <a:xfrm>
+            <a:off x="6858000" y="6037250"/>
+            <a:ext cx="457200" cy="457200"/>
+          </a:xfrm>
+          <a:prstGeom prst="rect">
+            <a:avLst/>
+          </a:prstGeom>
+          <a:noFill/>
+          <a:ln>
+            <a:noFill/>
+          </a:ln>
+          <a:extLst>
+            <a:ext uri="{909E8E84-426E-40DD-AFC4-6F175D3DCCD1}">
+              <a14:hiddenFill xmlns:a14="http://schemas.microsoft.com/office/drawing/2010/main">
+                <a:solidFill>
+                  <a:srgbClr val="FFFFFF"/>
+                </a:solidFill>
+              </a14:hiddenFill>
+            </a:ext>
+            <a:ext uri="{91240B29-F687-4F45-9708-019B960494DF}">
+              <a14:hiddenLine xmlns:a14="http://schemas.microsoft.com/office/drawing/2010/main" w="9525">
+                <a:solidFill>
+                  <a:srgbClr val="000000"/>
+                </a:solidFill>
+                <a:miter lim="800000"/>
+                <a:headEnd/>
+                <a:tailEnd/>
+              </a14:hiddenLine>
+            </a:ext>
+          </a:extLst>
         </p:spPr>
       </p:pic>
     </p:spTree>

</xml_diff>